<commit_message>
Added Presentations and slides and reports
</commit_message>
<xml_diff>
--- a/New PowerShell Commands For SQL Server/New PowerShell Commands For SQL Server.pptx
+++ b/New PowerShell Commands For SQL Server/New PowerShell Commands For SQL Server.pptx
@@ -5,20 +5,21 @@
     <p:sldMasterId id="2147483660" r:id="rId1"/>
   </p:sldMasterIdLst>
   <p:notesMasterIdLst>
-    <p:notesMasterId r:id="rId13"/>
+    <p:notesMasterId r:id="rId14"/>
   </p:notesMasterIdLst>
   <p:sldIdLst>
     <p:sldId id="257" r:id="rId2"/>
-    <p:sldId id="258" r:id="rId3"/>
-    <p:sldId id="259" r:id="rId4"/>
-    <p:sldId id="260" r:id="rId5"/>
-    <p:sldId id="261" r:id="rId6"/>
-    <p:sldId id="262" r:id="rId7"/>
-    <p:sldId id="263" r:id="rId8"/>
-    <p:sldId id="264" r:id="rId9"/>
-    <p:sldId id="265" r:id="rId10"/>
-    <p:sldId id="266" r:id="rId11"/>
-    <p:sldId id="267" r:id="rId12"/>
+    <p:sldId id="268" r:id="rId3"/>
+    <p:sldId id="258" r:id="rId4"/>
+    <p:sldId id="259" r:id="rId5"/>
+    <p:sldId id="260" r:id="rId6"/>
+    <p:sldId id="261" r:id="rId7"/>
+    <p:sldId id="262" r:id="rId8"/>
+    <p:sldId id="263" r:id="rId9"/>
+    <p:sldId id="264" r:id="rId10"/>
+    <p:sldId id="265" r:id="rId11"/>
+    <p:sldId id="266" r:id="rId12"/>
+    <p:sldId id="267" r:id="rId13"/>
   </p:sldIdLst>
   <p:sldSz cx="12192000" cy="6858000"/>
   <p:notesSz cx="6858000" cy="9144000"/>
@@ -207,7 +208,7 @@
           <a:p>
             <a:fld id="{4052ACFE-D2BA-47C7-816B-A719BBA2E9F0}" type="datetimeFigureOut">
               <a:rPr lang="en-GB" smtClean="0"/>
-              <a:t>02/08/2016</a:t>
+              <a:t>10/11/2016</a:t>
             </a:fld>
             <a:endParaRPr lang="en-GB"/>
           </a:p>
@@ -728,7 +729,7 @@
                 <a:tabLst/>
                 <a:defRPr/>
               </a:pPr>
-              <a:t>2</a:t>
+              <a:t>3</a:t>
             </a:fld>
             <a:endParaRPr kumimoji="0" lang="en-GB" sz="1800" b="0" i="0" u="none" strike="noStrike" kern="0" cap="none" spc="0" normalizeH="0" baseline="0" noProof="0">
               <a:ln>
@@ -758,147 +759,6 @@
 </file>
 
 <file path=ppt/notesSlides/notesSlide3.xml><?xml version="1.0" encoding="utf-8"?>
-<p:notes xmlns:a="http://schemas.openxmlformats.org/drawingml/2006/main" xmlns:r="http://schemas.openxmlformats.org/officeDocument/2006/relationships" xmlns:p="http://schemas.openxmlformats.org/presentationml/2006/main">
-  <p:cSld>
-    <p:spTree>
-      <p:nvGrpSpPr>
-        <p:cNvPr id="1" name=""/>
-        <p:cNvGrpSpPr/>
-        <p:nvPr/>
-      </p:nvGrpSpPr>
-      <p:grpSpPr>
-        <a:xfrm>
-          <a:off x="0" y="0"/>
-          <a:ext cx="0" cy="0"/>
-          <a:chOff x="0" y="0"/>
-          <a:chExt cx="0" cy="0"/>
-        </a:xfrm>
-      </p:grpSpPr>
-      <p:sp>
-        <p:nvSpPr>
-          <p:cNvPr id="2" name="Slide Image Placeholder 1"/>
-          <p:cNvSpPr>
-            <a:spLocks noGrp="1" noRot="1" noChangeAspect="1"/>
-          </p:cNvSpPr>
-          <p:nvPr>
-            <p:ph type="sldImg"/>
-          </p:nvPr>
-        </p:nvSpPr>
-        <p:spPr/>
-      </p:sp>
-      <p:sp>
-        <p:nvSpPr>
-          <p:cNvPr id="3" name="Notes Placeholder 2"/>
-          <p:cNvSpPr>
-            <a:spLocks noGrp="1"/>
-          </p:cNvSpPr>
-          <p:nvPr>
-            <p:ph type="body" idx="1"/>
-          </p:nvPr>
-        </p:nvSpPr>
-        <p:spPr/>
-        <p:txBody>
-          <a:bodyPr/>
-          <a:lstStyle/>
-          <a:p>
-            <a:r>
-              <a:rPr lang="en-GB" dirty="0"/>
-              <a:t>I will be tweeting links as we go</a:t>
-            </a:r>
-          </a:p>
-        </p:txBody>
-      </p:sp>
-      <p:sp>
-        <p:nvSpPr>
-          <p:cNvPr id="4" name="Slide Number Placeholder 3"/>
-          <p:cNvSpPr>
-            <a:spLocks noGrp="1"/>
-          </p:cNvSpPr>
-          <p:nvPr>
-            <p:ph type="sldNum" sz="quarter" idx="10"/>
-          </p:nvPr>
-        </p:nvSpPr>
-        <p:spPr/>
-        <p:txBody>
-          <a:bodyPr/>
-          <a:lstStyle/>
-          <a:p>
-            <a:pPr marL="0" marR="0" lvl="0" indent="0" defTabSz="914400" eaLnBrk="1" fontAlgn="auto" latinLnBrk="0" hangingPunct="1">
-              <a:lnSpc>
-                <a:spcPct val="100000"/>
-              </a:lnSpc>
-              <a:spcBef>
-                <a:spcPts val="0"/>
-              </a:spcBef>
-              <a:spcAft>
-                <a:spcPts val="0"/>
-              </a:spcAft>
-              <a:buClrTx/>
-              <a:buSzTx/>
-              <a:buFontTx/>
-              <a:buNone/>
-              <a:tabLst/>
-              <a:defRPr/>
-            </a:pPr>
-            <a:fld id="{83B53AC6-6B91-4280-875D-DCE6BDC8F9D8}" type="slidenum">
-              <a:rPr kumimoji="0" lang="en-GB" sz="1800" b="0" i="0" u="none" strike="noStrike" kern="0" cap="none" spc="0" normalizeH="0" baseline="0" noProof="0" smtClean="0">
-                <a:ln>
-                  <a:noFill/>
-                </a:ln>
-                <a:solidFill>
-                  <a:sysClr val="windowText" lastClr="000000"/>
-                </a:solidFill>
-                <a:effectLst/>
-                <a:uLnTx/>
-                <a:uFillTx/>
-              </a:rPr>
-              <a:pPr marL="0" marR="0" lvl="0" indent="0" defTabSz="914400" eaLnBrk="1" fontAlgn="auto" latinLnBrk="0" hangingPunct="1">
-                <a:lnSpc>
-                  <a:spcPct val="100000"/>
-                </a:lnSpc>
-                <a:spcBef>
-                  <a:spcPts val="0"/>
-                </a:spcBef>
-                <a:spcAft>
-                  <a:spcPts val="0"/>
-                </a:spcAft>
-                <a:buClrTx/>
-                <a:buSzTx/>
-                <a:buFontTx/>
-                <a:buNone/>
-                <a:tabLst/>
-                <a:defRPr/>
-              </a:pPr>
-              <a:t>3</a:t>
-            </a:fld>
-            <a:endParaRPr kumimoji="0" lang="en-GB" sz="1800" b="0" i="0" u="none" strike="noStrike" kern="0" cap="none" spc="0" normalizeH="0" baseline="0" noProof="0">
-              <a:ln>
-                <a:noFill/>
-              </a:ln>
-              <a:solidFill>
-                <a:sysClr val="windowText" lastClr="000000"/>
-              </a:solidFill>
-              <a:effectLst/>
-              <a:uLnTx/>
-              <a:uFillTx/>
-            </a:endParaRPr>
-          </a:p>
-        </p:txBody>
-      </p:sp>
-    </p:spTree>
-    <p:extLst>
-      <p:ext uri="{BB962C8B-B14F-4D97-AF65-F5344CB8AC3E}">
-        <p14:creationId xmlns:p14="http://schemas.microsoft.com/office/powerpoint/2010/main" val="1081989585"/>
-      </p:ext>
-    </p:extLst>
-  </p:cSld>
-  <p:clrMapOvr>
-    <a:masterClrMapping/>
-  </p:clrMapOvr>
-</p:notes>
-</file>
-
-<file path=ppt/notesSlides/notesSlide4.xml><?xml version="1.0" encoding="utf-8"?>
 <p:notes xmlns:a="http://schemas.openxmlformats.org/drawingml/2006/main" xmlns:r="http://schemas.openxmlformats.org/officeDocument/2006/relationships" xmlns:p="http://schemas.openxmlformats.org/presentationml/2006/main">
   <p:cSld>
     <p:spTree>
@@ -1029,7 +889,7 @@
     </p:spTree>
     <p:extLst>
       <p:ext uri="{BB962C8B-B14F-4D97-AF65-F5344CB8AC3E}">
-        <p14:creationId xmlns:p14="http://schemas.microsoft.com/office/powerpoint/2010/main" val="2083867532"/>
+        <p14:creationId xmlns:p14="http://schemas.microsoft.com/office/powerpoint/2010/main" val="1081989585"/>
       </p:ext>
     </p:extLst>
   </p:cSld>
@@ -1039,7 +899,7 @@
 </p:notes>
 </file>
 
-<file path=ppt/notesSlides/notesSlide5.xml><?xml version="1.0" encoding="utf-8"?>
+<file path=ppt/notesSlides/notesSlide4.xml><?xml version="1.0" encoding="utf-8"?>
 <p:notes xmlns:a="http://schemas.openxmlformats.org/drawingml/2006/main" xmlns:r="http://schemas.openxmlformats.org/officeDocument/2006/relationships" xmlns:p="http://schemas.openxmlformats.org/presentationml/2006/main">
   <p:cSld>
     <p:spTree>
@@ -1170,6 +1030,147 @@
     </p:spTree>
     <p:extLst>
       <p:ext uri="{BB962C8B-B14F-4D97-AF65-F5344CB8AC3E}">
+        <p14:creationId xmlns:p14="http://schemas.microsoft.com/office/powerpoint/2010/main" val="2083867532"/>
+      </p:ext>
+    </p:extLst>
+  </p:cSld>
+  <p:clrMapOvr>
+    <a:masterClrMapping/>
+  </p:clrMapOvr>
+</p:notes>
+</file>
+
+<file path=ppt/notesSlides/notesSlide5.xml><?xml version="1.0" encoding="utf-8"?>
+<p:notes xmlns:a="http://schemas.openxmlformats.org/drawingml/2006/main" xmlns:r="http://schemas.openxmlformats.org/officeDocument/2006/relationships" xmlns:p="http://schemas.openxmlformats.org/presentationml/2006/main">
+  <p:cSld>
+    <p:spTree>
+      <p:nvGrpSpPr>
+        <p:cNvPr id="1" name=""/>
+        <p:cNvGrpSpPr/>
+        <p:nvPr/>
+      </p:nvGrpSpPr>
+      <p:grpSpPr>
+        <a:xfrm>
+          <a:off x="0" y="0"/>
+          <a:ext cx="0" cy="0"/>
+          <a:chOff x="0" y="0"/>
+          <a:chExt cx="0" cy="0"/>
+        </a:xfrm>
+      </p:grpSpPr>
+      <p:sp>
+        <p:nvSpPr>
+          <p:cNvPr id="2" name="Slide Image Placeholder 1"/>
+          <p:cNvSpPr>
+            <a:spLocks noGrp="1" noRot="1" noChangeAspect="1"/>
+          </p:cNvSpPr>
+          <p:nvPr>
+            <p:ph type="sldImg"/>
+          </p:nvPr>
+        </p:nvSpPr>
+        <p:spPr/>
+      </p:sp>
+      <p:sp>
+        <p:nvSpPr>
+          <p:cNvPr id="3" name="Notes Placeholder 2"/>
+          <p:cNvSpPr>
+            <a:spLocks noGrp="1"/>
+          </p:cNvSpPr>
+          <p:nvPr>
+            <p:ph type="body" idx="1"/>
+          </p:nvPr>
+        </p:nvSpPr>
+        <p:spPr/>
+        <p:txBody>
+          <a:bodyPr/>
+          <a:lstStyle/>
+          <a:p>
+            <a:r>
+              <a:rPr lang="en-GB" dirty="0"/>
+              <a:t>I will be tweeting links as we go</a:t>
+            </a:r>
+          </a:p>
+        </p:txBody>
+      </p:sp>
+      <p:sp>
+        <p:nvSpPr>
+          <p:cNvPr id="4" name="Slide Number Placeholder 3"/>
+          <p:cNvSpPr>
+            <a:spLocks noGrp="1"/>
+          </p:cNvSpPr>
+          <p:nvPr>
+            <p:ph type="sldNum" sz="quarter" idx="10"/>
+          </p:nvPr>
+        </p:nvSpPr>
+        <p:spPr/>
+        <p:txBody>
+          <a:bodyPr/>
+          <a:lstStyle/>
+          <a:p>
+            <a:pPr marL="0" marR="0" lvl="0" indent="0" defTabSz="914400" eaLnBrk="1" fontAlgn="auto" latinLnBrk="0" hangingPunct="1">
+              <a:lnSpc>
+                <a:spcPct val="100000"/>
+              </a:lnSpc>
+              <a:spcBef>
+                <a:spcPts val="0"/>
+              </a:spcBef>
+              <a:spcAft>
+                <a:spcPts val="0"/>
+              </a:spcAft>
+              <a:buClrTx/>
+              <a:buSzTx/>
+              <a:buFontTx/>
+              <a:buNone/>
+              <a:tabLst/>
+              <a:defRPr/>
+            </a:pPr>
+            <a:fld id="{83B53AC6-6B91-4280-875D-DCE6BDC8F9D8}" type="slidenum">
+              <a:rPr kumimoji="0" lang="en-GB" sz="1800" b="0" i="0" u="none" strike="noStrike" kern="0" cap="none" spc="0" normalizeH="0" baseline="0" noProof="0" smtClean="0">
+                <a:ln>
+                  <a:noFill/>
+                </a:ln>
+                <a:solidFill>
+                  <a:sysClr val="windowText" lastClr="000000"/>
+                </a:solidFill>
+                <a:effectLst/>
+                <a:uLnTx/>
+                <a:uFillTx/>
+              </a:rPr>
+              <a:pPr marL="0" marR="0" lvl="0" indent="0" defTabSz="914400" eaLnBrk="1" fontAlgn="auto" latinLnBrk="0" hangingPunct="1">
+                <a:lnSpc>
+                  <a:spcPct val="100000"/>
+                </a:lnSpc>
+                <a:spcBef>
+                  <a:spcPts val="0"/>
+                </a:spcBef>
+                <a:spcAft>
+                  <a:spcPts val="0"/>
+                </a:spcAft>
+                <a:buClrTx/>
+                <a:buSzTx/>
+                <a:buFontTx/>
+                <a:buNone/>
+                <a:tabLst/>
+                <a:defRPr/>
+              </a:pPr>
+              <a:t>6</a:t>
+            </a:fld>
+            <a:endParaRPr kumimoji="0" lang="en-GB" sz="1800" b="0" i="0" u="none" strike="noStrike" kern="0" cap="none" spc="0" normalizeH="0" baseline="0" noProof="0">
+              <a:ln>
+                <a:noFill/>
+              </a:ln>
+              <a:solidFill>
+                <a:sysClr val="windowText" lastClr="000000"/>
+              </a:solidFill>
+              <a:effectLst/>
+              <a:uLnTx/>
+              <a:uFillTx/>
+            </a:endParaRPr>
+          </a:p>
+        </p:txBody>
+      </p:sp>
+    </p:spTree>
+    <p:extLst>
+      <p:ext uri="{BB962C8B-B14F-4D97-AF65-F5344CB8AC3E}">
         <p14:creationId xmlns:p14="http://schemas.microsoft.com/office/powerpoint/2010/main" val="3230405429"/>
       </p:ext>
     </p:extLst>
@@ -1267,7 +1268,7 @@
           <a:p>
             <a:fld id="{83B53AC6-6B91-4280-875D-DCE6BDC8F9D8}" type="slidenum">
               <a:rPr lang="en-GB" smtClean="0"/>
-              <a:t>7</a:t>
+              <a:t>8</a:t>
             </a:fld>
             <a:endParaRPr lang="en-GB"/>
           </a:p>
@@ -1375,7 +1376,7 @@
           <a:p>
             <a:fld id="{83B53AC6-6B91-4280-875D-DCE6BDC8F9D8}" type="slidenum">
               <a:rPr lang="en-GB" smtClean="0"/>
-              <a:t>8</a:t>
+              <a:t>9</a:t>
             </a:fld>
             <a:endParaRPr lang="en-GB"/>
           </a:p>
@@ -1471,7 +1472,7 @@
           <a:p>
             <a:fld id="{83B53AC6-6B91-4280-875D-DCE6BDC8F9D8}" type="slidenum">
               <a:rPr lang="en-GB" smtClean="0"/>
-              <a:t>9</a:t>
+              <a:t>10</a:t>
             </a:fld>
             <a:endParaRPr lang="en-GB"/>
           </a:p>
@@ -1621,7 +1622,7 @@
           <a:p>
             <a:fld id="{20F3CBD0-B2C0-4FBB-B455-14180BE8B619}" type="datetimeFigureOut">
               <a:rPr lang="en-GB" smtClean="0"/>
-              <a:t>02/08/2016</a:t>
+              <a:t>10/11/2016</a:t>
             </a:fld>
             <a:endParaRPr lang="en-GB"/>
           </a:p>
@@ -1791,7 +1792,7 @@
           <a:p>
             <a:fld id="{20F3CBD0-B2C0-4FBB-B455-14180BE8B619}" type="datetimeFigureOut">
               <a:rPr lang="en-GB" smtClean="0"/>
-              <a:t>02/08/2016</a:t>
+              <a:t>10/11/2016</a:t>
             </a:fld>
             <a:endParaRPr lang="en-GB"/>
           </a:p>
@@ -1971,7 +1972,7 @@
           <a:p>
             <a:fld id="{20F3CBD0-B2C0-4FBB-B455-14180BE8B619}" type="datetimeFigureOut">
               <a:rPr lang="en-GB" smtClean="0"/>
-              <a:t>02/08/2016</a:t>
+              <a:t>10/11/2016</a:t>
             </a:fld>
             <a:endParaRPr lang="en-GB"/>
           </a:p>
@@ -2355,7 +2356,7 @@
           <a:p>
             <a:fld id="{20F3CBD0-B2C0-4FBB-B455-14180BE8B619}" type="datetimeFigureOut">
               <a:rPr lang="en-GB" smtClean="0"/>
-              <a:t>02/08/2016</a:t>
+              <a:t>10/11/2016</a:t>
             </a:fld>
             <a:endParaRPr lang="en-GB"/>
           </a:p>
@@ -2601,7 +2602,7 @@
           <a:p>
             <a:fld id="{20F3CBD0-B2C0-4FBB-B455-14180BE8B619}" type="datetimeFigureOut">
               <a:rPr lang="en-GB" smtClean="0"/>
-              <a:t>02/08/2016</a:t>
+              <a:t>10/11/2016</a:t>
             </a:fld>
             <a:endParaRPr lang="en-GB"/>
           </a:p>
@@ -2833,7 +2834,7 @@
           <a:p>
             <a:fld id="{20F3CBD0-B2C0-4FBB-B455-14180BE8B619}" type="datetimeFigureOut">
               <a:rPr lang="en-GB" smtClean="0"/>
-              <a:t>02/08/2016</a:t>
+              <a:t>10/11/2016</a:t>
             </a:fld>
             <a:endParaRPr lang="en-GB"/>
           </a:p>
@@ -3200,7 +3201,7 @@
           <a:p>
             <a:fld id="{20F3CBD0-B2C0-4FBB-B455-14180BE8B619}" type="datetimeFigureOut">
               <a:rPr lang="en-GB" smtClean="0"/>
-              <a:t>02/08/2016</a:t>
+              <a:t>10/11/2016</a:t>
             </a:fld>
             <a:endParaRPr lang="en-GB"/>
           </a:p>
@@ -3318,7 +3319,7 @@
           <a:p>
             <a:fld id="{20F3CBD0-B2C0-4FBB-B455-14180BE8B619}" type="datetimeFigureOut">
               <a:rPr lang="en-GB" smtClean="0"/>
-              <a:t>02/08/2016</a:t>
+              <a:t>10/11/2016</a:t>
             </a:fld>
             <a:endParaRPr lang="en-GB"/>
           </a:p>
@@ -3413,7 +3414,7 @@
           <a:p>
             <a:fld id="{20F3CBD0-B2C0-4FBB-B455-14180BE8B619}" type="datetimeFigureOut">
               <a:rPr lang="en-GB" smtClean="0"/>
-              <a:t>02/08/2016</a:t>
+              <a:t>10/11/2016</a:t>
             </a:fld>
             <a:endParaRPr lang="en-GB"/>
           </a:p>
@@ -3690,7 +3691,7 @@
           <a:p>
             <a:fld id="{20F3CBD0-B2C0-4FBB-B455-14180BE8B619}" type="datetimeFigureOut">
               <a:rPr lang="en-GB" smtClean="0"/>
-              <a:t>02/08/2016</a:t>
+              <a:t>10/11/2016</a:t>
             </a:fld>
             <a:endParaRPr lang="en-GB"/>
           </a:p>
@@ -3943,7 +3944,7 @@
           <a:p>
             <a:fld id="{20F3CBD0-B2C0-4FBB-B455-14180BE8B619}" type="datetimeFigureOut">
               <a:rPr lang="en-GB" smtClean="0"/>
-              <a:t>02/08/2016</a:t>
+              <a:t>10/11/2016</a:t>
             </a:fld>
             <a:endParaRPr lang="en-GB"/>
           </a:p>
@@ -4156,7 +4157,7 @@
           <a:p>
             <a:fld id="{20F3CBD0-B2C0-4FBB-B455-14180BE8B619}" type="datetimeFigureOut">
               <a:rPr lang="en-GB" smtClean="0"/>
-              <a:t>02/08/2016</a:t>
+              <a:t>10/11/2016</a:t>
             </a:fld>
             <a:endParaRPr lang="en-GB"/>
           </a:p>
@@ -4947,6 +4948,231 @@
       </p:grpSpPr>
       <p:sp>
         <p:nvSpPr>
+          <p:cNvPr id="5" name="Rectangle 4"/>
+          <p:cNvSpPr>
+            <a:spLocks noGrp="1" noRot="1" noChangeAspect="1" noMove="1" noResize="1" noEditPoints="1" noAdjustHandles="1" noChangeArrowheads="1" noChangeShapeType="1" noTextEdit="1"/>
+          </p:cNvSpPr>
+          <p:nvPr>
+            <p:extLst>
+              <p:ext uri="{386F3935-93C4-4BCD-93E2-E3B085C9AB24}">
+                <p16:designElem xmlns:p16="http://schemas.microsoft.com/office/powerpoint/2015/main" val="1"/>
+              </p:ext>
+            </p:extLst>
+          </p:nvPr>
+        </p:nvSpPr>
+        <p:spPr bwMode="white">
+          <a:xfrm>
+            <a:off x="0" y="0"/>
+            <a:ext cx="12192000" cy="6858000"/>
+          </a:xfrm>
+          <a:prstGeom prst="rect">
+            <a:avLst/>
+          </a:prstGeom>
+          <a:solidFill>
+            <a:schemeClr val="bg1"/>
+          </a:solidFill>
+          <a:ln>
+            <a:noFill/>
+          </a:ln>
+          <a:effectLst/>
+        </p:spPr>
+      </p:sp>
+      <p:pic>
+        <p:nvPicPr>
+          <p:cNvPr id="3" name="Picture 2"/>
+          <p:cNvPicPr>
+            <a:picLocks noChangeAspect="1"/>
+          </p:cNvPicPr>
+          <p:nvPr/>
+        </p:nvPicPr>
+        <p:blipFill>
+          <a:blip r:embed="rId3">
+            <a:extLst>
+              <a:ext uri="{28A0092B-C50C-407E-A947-70E740481C1C}">
+                <a14:useLocalDpi xmlns:a14="http://schemas.microsoft.com/office/drawing/2010/main" val="0"/>
+              </a:ext>
+            </a:extLst>
+          </a:blip>
+          <a:stretch>
+            <a:fillRect/>
+          </a:stretch>
+        </p:blipFill>
+        <p:spPr>
+          <a:xfrm>
+            <a:off x="5153822" y="582179"/>
+            <a:ext cx="6553545" cy="5701583"/>
+          </a:xfrm>
+          <a:prstGeom prst="rect">
+            <a:avLst/>
+          </a:prstGeom>
+        </p:spPr>
+      </p:pic>
+      <p:sp>
+        <p:nvSpPr>
+          <p:cNvPr id="6" name="Rectangle 5"/>
+          <p:cNvSpPr>
+            <a:spLocks noGrp="1" noRot="1" noChangeAspect="1" noMove="1" noResize="1" noEditPoints="1" noAdjustHandles="1" noChangeArrowheads="1" noChangeShapeType="1" noTextEdit="1"/>
+          </p:cNvSpPr>
+          <p:nvPr>
+            <p:extLst>
+              <p:ext uri="{386F3935-93C4-4BCD-93E2-E3B085C9AB24}">
+                <p16:designElem xmlns:p16="http://schemas.microsoft.com/office/powerpoint/2015/main" val="1"/>
+              </p:ext>
+            </p:extLst>
+          </p:nvPr>
+        </p:nvSpPr>
+        <p:spPr bwMode="ltGray">
+          <a:xfrm>
+            <a:off x="336884" y="311449"/>
+            <a:ext cx="4332307" cy="6179552"/>
+          </a:xfrm>
+          <a:prstGeom prst="rect">
+            <a:avLst/>
+          </a:prstGeom>
+          <a:solidFill>
+            <a:schemeClr val="tx1">
+              <a:lumMod val="75000"/>
+              <a:lumOff val="25000"/>
+            </a:schemeClr>
+          </a:solidFill>
+          <a:ln w="127000" cap="sq" cmpd="thinThick">
+            <a:solidFill>
+              <a:schemeClr val="tx1">
+                <a:lumMod val="75000"/>
+                <a:lumOff val="25000"/>
+              </a:schemeClr>
+            </a:solidFill>
+          </a:ln>
+        </p:spPr>
+        <p:style>
+          <a:lnRef idx="2">
+            <a:schemeClr val="accent1">
+              <a:shade val="50000"/>
+            </a:schemeClr>
+          </a:lnRef>
+          <a:fillRef idx="1">
+            <a:schemeClr val="accent1"/>
+          </a:fillRef>
+          <a:effectRef idx="0">
+            <a:schemeClr val="accent1"/>
+          </a:effectRef>
+          <a:fontRef idx="minor">
+            <a:schemeClr val="lt1"/>
+          </a:fontRef>
+        </p:style>
+        <p:txBody>
+          <a:bodyPr rtlCol="0" anchor="ctr"/>
+          <a:lstStyle/>
+          <a:p>
+            <a:pPr algn="ctr"/>
+            <a:endParaRPr lang="en-US"/>
+          </a:p>
+        </p:txBody>
+      </p:sp>
+      <p:sp>
+        <p:nvSpPr>
+          <p:cNvPr id="2" name="TextBox 1"/>
+          <p:cNvSpPr txBox="1"/>
+          <p:nvPr/>
+        </p:nvSpPr>
+        <p:spPr>
+          <a:xfrm>
+            <a:off x="742950" y="742951"/>
+            <a:ext cx="3476625" cy="4962524"/>
+          </a:xfrm>
+          <a:prstGeom prst="rect">
+            <a:avLst/>
+          </a:prstGeom>
+        </p:spPr>
+        <p:txBody>
+          <a:bodyPr vert="horz" lIns="91440" tIns="45720" rIns="91440" bIns="45720" rtlCol="0" anchor="ctr">
+            <a:normAutofit/>
+          </a:bodyPr>
+          <a:lstStyle/>
+          <a:p>
+            <a:pPr algn="ctr">
+              <a:lnSpc>
+                <a:spcPct val="90000"/>
+              </a:lnSpc>
+              <a:spcBef>
+                <a:spcPct val="0"/>
+              </a:spcBef>
+            </a:pPr>
+            <a:r>
+              <a:rPr lang="en-US" sz="4800">
+                <a:solidFill>
+                  <a:schemeClr val="bg1"/>
+                </a:solidFill>
+                <a:latin typeface="+mj-lt"/>
+                <a:ea typeface="+mj-ea"/>
+                <a:cs typeface="+mj-cs"/>
+              </a:rPr>
+              <a:t>Questions?</a:t>
+            </a:r>
+          </a:p>
+        </p:txBody>
+      </p:sp>
+      <p:sp>
+        <p:nvSpPr>
+          <p:cNvPr id="4" name="TextBox 3"/>
+          <p:cNvSpPr txBox="1"/>
+          <p:nvPr/>
+        </p:nvSpPr>
+        <p:spPr>
+          <a:xfrm>
+            <a:off x="5887890" y="6306671"/>
+            <a:ext cx="3573075" cy="184666"/>
+          </a:xfrm>
+          <a:prstGeom prst="rect">
+            <a:avLst/>
+          </a:prstGeom>
+          <a:noFill/>
+        </p:spPr>
+        <p:txBody>
+          <a:bodyPr wrap="square" rtlCol="0">
+            <a:spAutoFit/>
+          </a:bodyPr>
+          <a:lstStyle/>
+          <a:p>
+            <a:r>
+              <a:rPr lang="en-GB" sz="600" dirty="0"/>
+              <a:t>http://www.menshairforum.com/talk/Thread-Beard-Facts-and-Beards-Meme-Facial-Hair-Manly-Knowledge</a:t>
+            </a:r>
+          </a:p>
+        </p:txBody>
+      </p:sp>
+    </p:spTree>
+    <p:extLst>
+      <p:ext uri="{BB962C8B-B14F-4D97-AF65-F5344CB8AC3E}">
+        <p14:creationId xmlns:p14="http://schemas.microsoft.com/office/powerpoint/2010/main" val="1616556363"/>
+      </p:ext>
+    </p:extLst>
+  </p:cSld>
+  <p:clrMapOvr>
+    <a:masterClrMapping/>
+  </p:clrMapOvr>
+</p:sld>
+</file>
+
+<file path=ppt/slides/slide11.xml><?xml version="1.0" encoding="utf-8"?>
+<p:sld xmlns:a="http://schemas.openxmlformats.org/drawingml/2006/main" xmlns:r="http://schemas.openxmlformats.org/officeDocument/2006/relationships" xmlns:p="http://schemas.openxmlformats.org/presentationml/2006/main">
+  <p:cSld>
+    <p:spTree>
+      <p:nvGrpSpPr>
+        <p:cNvPr id="1" name=""/>
+        <p:cNvGrpSpPr/>
+        <p:nvPr/>
+      </p:nvGrpSpPr>
+      <p:grpSpPr>
+        <a:xfrm>
+          <a:off x="0" y="0"/>
+          <a:ext cx="0" cy="0"/>
+          <a:chOff x="0" y="0"/>
+          <a:chExt cx="0" cy="0"/>
+        </a:xfrm>
+      </p:grpSpPr>
+      <p:sp>
+        <p:nvSpPr>
           <p:cNvPr id="2" name="TextBox 1"/>
           <p:cNvSpPr txBox="1"/>
           <p:nvPr/>
@@ -5079,7 +5305,7 @@
 </p:sld>
 </file>
 
-<file path=ppt/slides/slide11.xml><?xml version="1.0" encoding="utf-8"?>
+<file path=ppt/slides/slide12.xml><?xml version="1.0" encoding="utf-8"?>
 <p:sld xmlns:a="http://schemas.openxmlformats.org/drawingml/2006/main" xmlns:r="http://schemas.openxmlformats.org/officeDocument/2006/relationships" xmlns:p="http://schemas.openxmlformats.org/presentationml/2006/main">
   <p:cSld>
     <p:spTree>
@@ -5193,6 +5419,367 @@
       </p:grpSpPr>
       <p:sp>
         <p:nvSpPr>
+          <p:cNvPr id="2" name="TextBox 1"/>
+          <p:cNvSpPr txBox="1"/>
+          <p:nvPr/>
+        </p:nvSpPr>
+        <p:spPr>
+          <a:xfrm>
+            <a:off x="688975" y="843181"/>
+            <a:ext cx="11036300" cy="3785652"/>
+          </a:xfrm>
+          <a:prstGeom prst="rect">
+            <a:avLst/>
+          </a:prstGeom>
+          <a:noFill/>
+        </p:spPr>
+        <p:txBody>
+          <a:bodyPr wrap="square" rtlCol="0">
+            <a:spAutoFit/>
+          </a:bodyPr>
+          <a:lstStyle/>
+          <a:p>
+            <a:r>
+              <a:rPr lang="en-GB" sz="2400" dirty="0"/>
+              <a:t>Name : Rob</a:t>
+            </a:r>
+          </a:p>
+          <a:p>
+            <a:r>
+              <a:rPr lang="en-GB" sz="2400" dirty="0"/>
+              <a:t>Occupation : DBA, </a:t>
+            </a:r>
+            <a:r>
+              <a:rPr lang="en-GB" sz="2400" dirty="0" err="1"/>
+              <a:t>Automator</a:t>
+            </a:r>
+            <a:r>
+              <a:rPr lang="en-GB" sz="2400" dirty="0"/>
+              <a:t>, Do-</a:t>
+            </a:r>
+            <a:r>
+              <a:rPr lang="en-GB" sz="2400" dirty="0" err="1"/>
+              <a:t>er</a:t>
+            </a:r>
+            <a:endParaRPr lang="en-GB" sz="2400" dirty="0"/>
+          </a:p>
+          <a:p>
+            <a:r>
+              <a:rPr lang="en-GB" sz="2400" dirty="0"/>
+              <a:t>Interests : PowerShell, Automation And SQL (PaaS </a:t>
+            </a:r>
+            <a:r>
+              <a:rPr lang="en-GB" sz="2400" dirty="0" err="1"/>
+              <a:t>geddit</a:t>
+            </a:r>
+            <a:r>
+              <a:rPr lang="en-GB" sz="2400" dirty="0"/>
+              <a:t>?)</a:t>
+            </a:r>
+          </a:p>
+          <a:p>
+            <a:r>
+              <a:rPr lang="en-GB" sz="2400" dirty="0"/>
+              <a:t>Website : sqldbawith</a:t>
+            </a:r>
+            <a:r>
+              <a:rPr lang="en-GB" sz="2400" dirty="0">
+                <a:solidFill>
+                  <a:srgbClr val="FF0000"/>
+                </a:solidFill>
+              </a:rPr>
+              <a:t>A</a:t>
+            </a:r>
+            <a:r>
+              <a:rPr lang="en-GB" sz="2400" dirty="0"/>
+              <a:t>beard.com</a:t>
+            </a:r>
+          </a:p>
+          <a:p>
+            <a:r>
+              <a:rPr lang="en-GB" sz="2400" dirty="0"/>
+              <a:t>Twitter : @</a:t>
+            </a:r>
+            <a:r>
+              <a:rPr lang="en-GB" sz="2400" dirty="0" err="1"/>
+              <a:t>sqldbawithbeard</a:t>
+            </a:r>
+            <a:endParaRPr lang="en-GB" sz="2400" dirty="0"/>
+          </a:p>
+          <a:p>
+            <a:r>
+              <a:rPr lang="en-GB" sz="2400" dirty="0"/>
+              <a:t>Interesting Fact : Has a Beard. (Still) Plays Cricket</a:t>
+            </a:r>
+          </a:p>
+          <a:p>
+            <a:r>
+              <a:rPr lang="en-GB" sz="2400" dirty="0"/>
+              <a:t>Speaker : SQL Saturdays, SQL Relay, PowerShell Conference EU</a:t>
+            </a:r>
+          </a:p>
+          <a:p>
+            <a:r>
+              <a:rPr lang="en-GB" sz="2400" dirty="0"/>
+              <a:t>Community : SQL South West , SQL Saturday Exeter , PowerShell Virtual Chapter, Organiser for PowerShell Conference EU 2017, Officer, Lead for </a:t>
+            </a:r>
+            <a:r>
+              <a:rPr lang="en-GB" sz="2400" dirty="0" err="1"/>
+              <a:t>dbareports</a:t>
+            </a:r>
+            <a:r>
+              <a:rPr lang="en-GB" sz="2400" dirty="0"/>
+              <a:t>, contributor to </a:t>
+            </a:r>
+            <a:r>
+              <a:rPr lang="en-GB" sz="2400" dirty="0" err="1"/>
+              <a:t>dbatools</a:t>
+            </a:r>
+            <a:r>
+              <a:rPr lang="en-GB" sz="2400" dirty="0"/>
+              <a:t> </a:t>
+            </a:r>
+          </a:p>
+        </p:txBody>
+      </p:sp>
+      <p:sp>
+        <p:nvSpPr>
+          <p:cNvPr id="4" name="TextBox 3"/>
+          <p:cNvSpPr txBox="1"/>
+          <p:nvPr/>
+        </p:nvSpPr>
+        <p:spPr>
+          <a:xfrm>
+            <a:off x="323850" y="196850"/>
+            <a:ext cx="11766550" cy="646331"/>
+          </a:xfrm>
+          <a:prstGeom prst="rect">
+            <a:avLst/>
+          </a:prstGeom>
+          <a:noFill/>
+        </p:spPr>
+        <p:txBody>
+          <a:bodyPr wrap="square" rtlCol="0">
+            <a:spAutoFit/>
+          </a:bodyPr>
+          <a:lstStyle/>
+          <a:p>
+            <a:pPr algn="ctr"/>
+            <a:r>
+              <a:rPr lang="en-GB" sz="3600" dirty="0"/>
+              <a:t>Speaker Questionnaire </a:t>
+            </a:r>
+          </a:p>
+        </p:txBody>
+      </p:sp>
+      <p:pic>
+        <p:nvPicPr>
+          <p:cNvPr id="7" name="Picture 6"/>
+          <p:cNvPicPr>
+            <a:picLocks noChangeAspect="1"/>
+          </p:cNvPicPr>
+          <p:nvPr/>
+        </p:nvPicPr>
+        <p:blipFill>
+          <a:blip r:embed="rId2"/>
+          <a:stretch>
+            <a:fillRect/>
+          </a:stretch>
+        </p:blipFill>
+        <p:spPr>
+          <a:xfrm>
+            <a:off x="4577512" y="4462928"/>
+            <a:ext cx="2973055" cy="2147691"/>
+          </a:xfrm>
+          <a:prstGeom prst="rect">
+            <a:avLst/>
+          </a:prstGeom>
+        </p:spPr>
+      </p:pic>
+      <p:pic>
+        <p:nvPicPr>
+          <p:cNvPr id="8" name="Picture 7"/>
+          <p:cNvPicPr>
+            <a:picLocks noChangeAspect="1"/>
+          </p:cNvPicPr>
+          <p:nvPr/>
+        </p:nvPicPr>
+        <p:blipFill>
+          <a:blip r:embed="rId3">
+            <a:extLst>
+              <a:ext uri="{28A0092B-C50C-407E-A947-70E740481C1C}">
+                <a14:useLocalDpi xmlns:a14="http://schemas.microsoft.com/office/drawing/2010/main" val="0"/>
+              </a:ext>
+            </a:extLst>
+          </a:blip>
+          <a:stretch>
+            <a:fillRect/>
+          </a:stretch>
+        </p:blipFill>
+        <p:spPr>
+          <a:xfrm>
+            <a:off x="8535099" y="4059894"/>
+            <a:ext cx="2205644" cy="2205644"/>
+          </a:xfrm>
+          <a:prstGeom prst="rect">
+            <a:avLst/>
+          </a:prstGeom>
+        </p:spPr>
+      </p:pic>
+      <p:sp>
+        <p:nvSpPr>
+          <p:cNvPr id="9" name="TextBox 8"/>
+          <p:cNvSpPr txBox="1"/>
+          <p:nvPr/>
+        </p:nvSpPr>
+        <p:spPr>
+          <a:xfrm>
+            <a:off x="8695690" y="5964288"/>
+            <a:ext cx="3029585" cy="646331"/>
+          </a:xfrm>
+          <a:prstGeom prst="rect">
+            <a:avLst/>
+          </a:prstGeom>
+          <a:noFill/>
+        </p:spPr>
+        <p:txBody>
+          <a:bodyPr wrap="square" rtlCol="0">
+            <a:spAutoFit/>
+          </a:bodyPr>
+          <a:lstStyle/>
+          <a:p>
+            <a:r>
+              <a:rPr lang="en-GB" dirty="0">
+                <a:hlinkClick r:id="rId4"/>
+              </a:rPr>
+              <a:t>https://dbareports.io</a:t>
+            </a:r>
+            <a:r>
+              <a:rPr lang="en-GB" dirty="0"/>
+              <a:t> </a:t>
+            </a:r>
+          </a:p>
+          <a:p>
+            <a:r>
+              <a:rPr lang="en-GB" dirty="0"/>
+              <a:t>@</a:t>
+            </a:r>
+            <a:r>
+              <a:rPr lang="en-GB" dirty="0" err="1"/>
+              <a:t>psdbareports</a:t>
+            </a:r>
+            <a:endParaRPr lang="en-GB" dirty="0"/>
+          </a:p>
+        </p:txBody>
+      </p:sp>
+      <p:pic>
+        <p:nvPicPr>
+          <p:cNvPr id="3" name="Picture 2"/>
+          <p:cNvPicPr>
+            <a:picLocks noChangeAspect="1"/>
+          </p:cNvPicPr>
+          <p:nvPr/>
+        </p:nvPicPr>
+        <p:blipFill>
+          <a:blip r:embed="rId5">
+            <a:extLst>
+              <a:ext uri="{28A0092B-C50C-407E-A947-70E740481C1C}">
+                <a14:useLocalDpi xmlns:a14="http://schemas.microsoft.com/office/drawing/2010/main" val="0"/>
+              </a:ext>
+            </a:extLst>
+          </a:blip>
+          <a:stretch>
+            <a:fillRect/>
+          </a:stretch>
+        </p:blipFill>
+        <p:spPr>
+          <a:xfrm>
+            <a:off x="647953" y="4536773"/>
+            <a:ext cx="1625970" cy="1625970"/>
+          </a:xfrm>
+          <a:prstGeom prst="rect">
+            <a:avLst/>
+          </a:prstGeom>
+        </p:spPr>
+      </p:pic>
+      <p:sp>
+        <p:nvSpPr>
+          <p:cNvPr id="5" name="TextBox 4"/>
+          <p:cNvSpPr txBox="1"/>
+          <p:nvPr/>
+        </p:nvSpPr>
+        <p:spPr>
+          <a:xfrm>
+            <a:off x="744164" y="6046796"/>
+            <a:ext cx="2664372" cy="646331"/>
+          </a:xfrm>
+          <a:prstGeom prst="rect">
+            <a:avLst/>
+          </a:prstGeom>
+          <a:noFill/>
+        </p:spPr>
+        <p:txBody>
+          <a:bodyPr wrap="square" rtlCol="0">
+            <a:spAutoFit/>
+          </a:bodyPr>
+          <a:lstStyle/>
+          <a:p>
+            <a:r>
+              <a:rPr lang="en-GB" dirty="0">
+                <a:hlinkClick r:id="rId6"/>
+              </a:rPr>
+              <a:t>https://dbatools.io</a:t>
+            </a:r>
+            <a:r>
+              <a:rPr lang="en-GB" dirty="0"/>
+              <a:t> </a:t>
+            </a:r>
+          </a:p>
+          <a:p>
+            <a:r>
+              <a:rPr lang="en-GB" dirty="0"/>
+              <a:t>@</a:t>
+            </a:r>
+            <a:r>
+              <a:rPr lang="en-GB" dirty="0" err="1"/>
+              <a:t>psdbatools</a:t>
+            </a:r>
+            <a:endParaRPr lang="en-GB" dirty="0"/>
+          </a:p>
+        </p:txBody>
+      </p:sp>
+    </p:spTree>
+    <p:extLst>
+      <p:ext uri="{BB962C8B-B14F-4D97-AF65-F5344CB8AC3E}">
+        <p14:creationId xmlns:p14="http://schemas.microsoft.com/office/powerpoint/2010/main" val="1538963976"/>
+      </p:ext>
+    </p:extLst>
+  </p:cSld>
+  <p:clrMapOvr>
+    <a:masterClrMapping/>
+  </p:clrMapOvr>
+</p:sld>
+</file>
+
+<file path=ppt/slides/slide3.xml><?xml version="1.0" encoding="utf-8"?>
+<p:sld xmlns:a="http://schemas.openxmlformats.org/drawingml/2006/main" xmlns:r="http://schemas.openxmlformats.org/officeDocument/2006/relationships" xmlns:p="http://schemas.openxmlformats.org/presentationml/2006/main">
+  <p:cSld>
+    <p:spTree>
+      <p:nvGrpSpPr>
+        <p:cNvPr id="1" name=""/>
+        <p:cNvGrpSpPr/>
+        <p:nvPr/>
+      </p:nvGrpSpPr>
+      <p:grpSpPr>
+        <a:xfrm>
+          <a:off x="0" y="0"/>
+          <a:ext cx="0" cy="0"/>
+          <a:chOff x="0" y="0"/>
+          <a:chExt cx="0" cy="0"/>
+        </a:xfrm>
+      </p:grpSpPr>
+      <p:sp>
+        <p:nvSpPr>
           <p:cNvPr id="3" name="Textplatzhalter 2"/>
           <p:cNvSpPr>
             <a:spLocks noGrp="1"/>
@@ -5775,7 +6362,7 @@
 </p:sld>
 </file>
 
-<file path=ppt/slides/slide3.xml><?xml version="1.0" encoding="utf-8"?>
+<file path=ppt/slides/slide4.xml><?xml version="1.0" encoding="utf-8"?>
 <p:sld xmlns:a="http://schemas.openxmlformats.org/drawingml/2006/main" xmlns:r="http://schemas.openxmlformats.org/officeDocument/2006/relationships" xmlns:p="http://schemas.openxmlformats.org/presentationml/2006/main">
   <p:cSld>
     <p:spTree>
@@ -6211,7 +6798,7 @@
 </p:sld>
 </file>
 
-<file path=ppt/slides/slide4.xml><?xml version="1.0" encoding="utf-8"?>
+<file path=ppt/slides/slide5.xml><?xml version="1.0" encoding="utf-8"?>
 <p:sld xmlns:a="http://schemas.openxmlformats.org/drawingml/2006/main" xmlns:r="http://schemas.openxmlformats.org/officeDocument/2006/relationships" xmlns:p="http://schemas.openxmlformats.org/presentationml/2006/main">
   <p:cSld>
     <p:spTree>
@@ -7453,7 +8040,7 @@
 </p:sld>
 </file>
 
-<file path=ppt/slides/slide5.xml><?xml version="1.0" encoding="utf-8"?>
+<file path=ppt/slides/slide6.xml><?xml version="1.0" encoding="utf-8"?>
 <p:sld xmlns:a="http://schemas.openxmlformats.org/drawingml/2006/main" xmlns:r="http://schemas.openxmlformats.org/officeDocument/2006/relationships" xmlns:p="http://schemas.openxmlformats.org/presentationml/2006/main">
   <p:cSld>
     <p:spTree>
@@ -7851,7 +8438,7 @@
 </p:sld>
 </file>
 
-<file path=ppt/slides/slide6.xml><?xml version="1.0" encoding="utf-8"?>
+<file path=ppt/slides/slide7.xml><?xml version="1.0" encoding="utf-8"?>
 <p:sld xmlns:a="http://schemas.openxmlformats.org/drawingml/2006/main" xmlns:r="http://schemas.openxmlformats.org/officeDocument/2006/relationships" xmlns:p="http://schemas.openxmlformats.org/presentationml/2006/main">
   <p:cSld>
     <p:spTree>
@@ -8036,110 +8623,6 @@
 </p:sld>
 </file>
 
-<file path=ppt/slides/slide7.xml><?xml version="1.0" encoding="utf-8"?>
-<p:sld xmlns:a="http://schemas.openxmlformats.org/drawingml/2006/main" xmlns:r="http://schemas.openxmlformats.org/officeDocument/2006/relationships" xmlns:p="http://schemas.openxmlformats.org/presentationml/2006/main">
-  <p:cSld>
-    <p:spTree>
-      <p:nvGrpSpPr>
-        <p:cNvPr id="1" name=""/>
-        <p:cNvGrpSpPr/>
-        <p:nvPr/>
-      </p:nvGrpSpPr>
-      <p:grpSpPr>
-        <a:xfrm>
-          <a:off x="0" y="0"/>
-          <a:ext cx="0" cy="0"/>
-          <a:chOff x="0" y="0"/>
-          <a:chExt cx="0" cy="0"/>
-        </a:xfrm>
-      </p:grpSpPr>
-      <p:sp>
-        <p:nvSpPr>
-          <p:cNvPr id="2" name="TextBox 1"/>
-          <p:cNvSpPr txBox="1"/>
-          <p:nvPr/>
-        </p:nvSpPr>
-        <p:spPr>
-          <a:xfrm>
-            <a:off x="442822" y="1046672"/>
-            <a:ext cx="11105071" cy="1877437"/>
-          </a:xfrm>
-          <a:prstGeom prst="rect">
-            <a:avLst/>
-          </a:prstGeom>
-          <a:noFill/>
-        </p:spPr>
-        <p:txBody>
-          <a:bodyPr wrap="square" rtlCol="0">
-            <a:spAutoFit/>
-          </a:bodyPr>
-          <a:lstStyle/>
-          <a:p>
-            <a:pPr algn="ctr"/>
-            <a:r>
-              <a:rPr lang="en-GB" sz="8000" dirty="0"/>
-              <a:t>You Want to Learn More?</a:t>
-            </a:r>
-          </a:p>
-          <a:p>
-            <a:endParaRPr lang="en-GB" dirty="0"/>
-          </a:p>
-          <a:p>
-            <a:pPr algn="ctr"/>
-            <a:r>
-              <a:rPr lang="en-GB" dirty="0"/>
-              <a:t>Obviously the rest of the sessions in todays PowerShell Track</a:t>
-            </a:r>
-          </a:p>
-        </p:txBody>
-      </p:sp>
-      <p:sp>
-        <p:nvSpPr>
-          <p:cNvPr id="3" name="TextBox 2"/>
-          <p:cNvSpPr txBox="1"/>
-          <p:nvPr/>
-        </p:nvSpPr>
-        <p:spPr>
-          <a:xfrm>
-            <a:off x="4939990" y="5865541"/>
-            <a:ext cx="3200400" cy="369332"/>
-          </a:xfrm>
-          <a:prstGeom prst="rect">
-            <a:avLst/>
-          </a:prstGeom>
-          <a:noFill/>
-        </p:spPr>
-        <p:txBody>
-          <a:bodyPr wrap="square" rtlCol="0">
-            <a:spAutoFit/>
-          </a:bodyPr>
-          <a:lstStyle/>
-          <a:p>
-            <a:r>
-              <a:rPr lang="en-GB" dirty="0"/>
-              <a:t>@</a:t>
-            </a:r>
-            <a:r>
-              <a:rPr lang="en-GB" dirty="0" err="1"/>
-              <a:t>sqldbawithbeard</a:t>
-            </a:r>
-            <a:endParaRPr lang="en-GB" dirty="0"/>
-          </a:p>
-        </p:txBody>
-      </p:sp>
-    </p:spTree>
-    <p:extLst>
-      <p:ext uri="{BB962C8B-B14F-4D97-AF65-F5344CB8AC3E}">
-        <p14:creationId xmlns:p14="http://schemas.microsoft.com/office/powerpoint/2010/main" val="2623941909"/>
-      </p:ext>
-    </p:extLst>
-  </p:cSld>
-  <p:clrMapOvr>
-    <a:masterClrMapping/>
-  </p:clrMapOvr>
-</p:sld>
-</file>
-
 <file path=ppt/slides/slide8.xml><?xml version="1.0" encoding="utf-8"?>
 <p:sld xmlns:a="http://schemas.openxmlformats.org/drawingml/2006/main" xmlns:r="http://schemas.openxmlformats.org/officeDocument/2006/relationships" xmlns:p="http://schemas.openxmlformats.org/presentationml/2006/main">
   <p:cSld>
@@ -8159,1127 +8642,152 @@
       </p:grpSpPr>
       <p:sp>
         <p:nvSpPr>
-          <p:cNvPr id="34" name="Rectangle 33"/>
-          <p:cNvSpPr/>
+          <p:cNvPr id="2" name="TextBox 1"/>
+          <p:cNvSpPr txBox="1"/>
           <p:nvPr/>
         </p:nvSpPr>
         <p:spPr>
           <a:xfrm>
-            <a:off x="2800710" y="347878"/>
-            <a:ext cx="6291531" cy="1633845"/>
-          </a:xfrm>
-          <a:prstGeom prst="rect">
-            <a:avLst/>
-          </a:prstGeom>
-        </p:spPr>
-        <p:txBody>
-          <a:bodyPr wrap="square">
-            <a:spAutoFit/>
-          </a:bodyPr>
-          <a:lstStyle/>
-          <a:p>
-            <a:pPr>
-              <a:lnSpc>
-                <a:spcPct val="113000"/>
-              </a:lnSpc>
-            </a:pPr>
-            <a:r>
-              <a:rPr lang="en-US" sz="4400" b="1" kern="1400" dirty="0">
-                <a:solidFill>
-                  <a:srgbClr val="000000"/>
-                </a:solidFill>
-                <a:latin typeface="Segoe UI" panose="020B0502040204020203" pitchFamily="34" charset="0"/>
-              </a:rPr>
-              <a:t>PowerShell VC of PASS</a:t>
-            </a:r>
-            <a:endParaRPr lang="en-US" sz="4400" kern="1400" dirty="0">
-              <a:solidFill>
-                <a:srgbClr val="000000"/>
-              </a:solidFill>
-              <a:latin typeface="Agency FB" panose="020B0503020202020204" pitchFamily="34" charset="0"/>
-            </a:endParaRPr>
-          </a:p>
-          <a:p>
-            <a:pPr>
-              <a:lnSpc>
-                <a:spcPct val="115000"/>
-              </a:lnSpc>
-            </a:pPr>
-            <a:r>
-              <a:rPr lang="en-US" sz="2400" kern="1400" dirty="0">
-                <a:solidFill>
-                  <a:srgbClr val="000000"/>
-                </a:solidFill>
-                <a:latin typeface="Calibri" panose="020F0502020204030204" pitchFamily="34" charset="0"/>
-              </a:rPr>
-              <a:t> </a:t>
-            </a:r>
-            <a:r>
-              <a:rPr lang="en-US" sz="2400" b="1" kern="1400" dirty="0">
-                <a:solidFill>
-                  <a:srgbClr val="3399FF"/>
-                </a:solidFill>
-                <a:latin typeface="Segoe UI" panose="020B0502040204020203" pitchFamily="34" charset="0"/>
-              </a:rPr>
-              <a:t>PowerShell for SQL Server</a:t>
-            </a:r>
-            <a:endParaRPr lang="en-US" sz="2400" b="1" kern="1400" dirty="0">
-              <a:solidFill>
-                <a:srgbClr val="3399FF"/>
-              </a:solidFill>
-              <a:latin typeface="Palatino Linotype" panose="02040502050505030304" pitchFamily="18" charset="0"/>
-            </a:endParaRPr>
-          </a:p>
-          <a:p>
-            <a:pPr>
-              <a:lnSpc>
-                <a:spcPct val="119000"/>
-              </a:lnSpc>
-              <a:spcAft>
-                <a:spcPts val="600"/>
-              </a:spcAft>
-            </a:pPr>
-            <a:r>
-              <a:rPr lang="en-US" sz="400" kern="1400" dirty="0">
-                <a:solidFill>
-                  <a:srgbClr val="000000"/>
-                </a:solidFill>
-                <a:latin typeface="Calibri" panose="020F0502020204030204" pitchFamily="34" charset="0"/>
-              </a:rPr>
-              <a:t> </a:t>
-            </a:r>
-          </a:p>
-          <a:p>
-            <a:pPr>
-              <a:lnSpc>
-                <a:spcPct val="119000"/>
-              </a:lnSpc>
-              <a:spcAft>
-                <a:spcPts val="600"/>
-              </a:spcAft>
-            </a:pPr>
-            <a:endParaRPr lang="en-US" sz="1100" kern="1400" dirty="0">
-              <a:ln>
-                <a:noFill/>
-              </a:ln>
-              <a:solidFill>
-                <a:srgbClr val="000000"/>
-              </a:solidFill>
-              <a:effectLst/>
-              <a:latin typeface="Calibri" panose="020F0502020204030204" pitchFamily="34" charset="0"/>
-            </a:endParaRPr>
-          </a:p>
-        </p:txBody>
-      </p:sp>
-      <p:pic>
-        <p:nvPicPr>
-          <p:cNvPr id="1062" name="Picture 38" descr="sqlps-icon-new-small"/>
-          <p:cNvPicPr>
-            <a:picLocks noChangeAspect="1" noChangeArrowheads="1"/>
-          </p:cNvPicPr>
-          <p:nvPr/>
-        </p:nvPicPr>
-        <p:blipFill>
-          <a:blip r:embed="rId3">
-            <a:extLst>
-              <a:ext uri="{28A0092B-C50C-407E-A947-70E740481C1C}">
-                <a14:useLocalDpi xmlns:a14="http://schemas.microsoft.com/office/drawing/2010/main" val="0"/>
-              </a:ext>
-            </a:extLst>
-          </a:blip>
-          <a:srcRect/>
-          <a:stretch>
-            <a:fillRect/>
-          </a:stretch>
-        </p:blipFill>
-        <p:spPr bwMode="auto">
-          <a:xfrm>
-            <a:off x="0" y="-1"/>
-            <a:ext cx="2058838" cy="1952712"/>
+            <a:off x="442822" y="1046672"/>
+            <a:ext cx="11105071" cy="1600438"/>
           </a:xfrm>
           <a:prstGeom prst="rect">
             <a:avLst/>
           </a:prstGeom>
           <a:noFill/>
-          <a:ln>
-            <a:noFill/>
-          </a:ln>
-          <a:effectLst/>
-          <a:extLst>
-            <a:ext uri="{909E8E84-426E-40DD-AFC4-6F175D3DCCD1}">
-              <a14:hiddenFill xmlns:a14="http://schemas.microsoft.com/office/drawing/2010/main">
-                <a:solidFill>
-                  <a:srgbClr val="3399FF"/>
-                </a:solidFill>
-              </a14:hiddenFill>
-            </a:ext>
-            <a:ext uri="{91240B29-F687-4F45-9708-019B960494DF}">
-              <a14:hiddenLine xmlns:a14="http://schemas.microsoft.com/office/drawing/2010/main" w="25400" algn="ctr">
-                <a:solidFill>
-                  <a:srgbClr val="000000"/>
-                </a:solidFill>
-                <a:miter lim="800000"/>
-                <a:headEnd/>
-                <a:tailEnd/>
-              </a14:hiddenLine>
-            </a:ext>
-            <a:ext uri="{AF507438-7753-43E0-B8FC-AC1667EBCBE1}">
-              <a14:hiddenEffects xmlns:a14="http://schemas.microsoft.com/office/drawing/2010/main">
-                <a:effectLst>
-                  <a:outerShdw dist="35921" dir="2700000" algn="ctr" rotWithShape="0">
-                    <a:srgbClr val="000000"/>
-                  </a:outerShdw>
-                </a:effectLst>
-              </a14:hiddenEffects>
-            </a:ext>
-          </a:extLst>
         </p:spPr>
-      </p:pic>
-      <p:sp>
-        <p:nvSpPr>
-          <p:cNvPr id="52" name="Rectangle 51"/>
-          <p:cNvSpPr/>
-          <p:nvPr/>
-        </p:nvSpPr>
-        <p:spPr>
-          <a:xfrm>
-            <a:off x="212306" y="2041725"/>
-            <a:ext cx="2473386" cy="2466253"/>
-          </a:xfrm>
-          <a:prstGeom prst="rect">
-            <a:avLst/>
-          </a:prstGeom>
-        </p:spPr>
-        <p:txBody>
-          <a:bodyPr wrap="square">
+        <p:txBody>
+          <a:bodyPr wrap="square" rtlCol="0">
             <a:spAutoFit/>
           </a:bodyPr>
           <a:lstStyle/>
           <a:p>
-            <a:r>
-              <a:rPr lang="en-US" sz="2400" kern="1400" dirty="0">
-                <a:solidFill>
-                  <a:srgbClr val="000000"/>
-                </a:solidFill>
-                <a:latin typeface="Segoe UI" panose="020B0502040204020203" pitchFamily="34" charset="0"/>
-              </a:rPr>
-              <a:t> </a:t>
-            </a:r>
-            <a:r>
-              <a:rPr lang="en-US" sz="2400" b="1" dirty="0"/>
-              <a:t>Join the Conversation</a:t>
-            </a:r>
-          </a:p>
-          <a:p>
-            <a:endParaRPr lang="en-US" sz="2400" dirty="0"/>
-          </a:p>
-          <a:p>
-            <a:r>
-              <a:rPr lang="en-US" dirty="0"/>
-              <a:t> </a:t>
-            </a:r>
-            <a:r>
-              <a:rPr lang="en-US" kern="1400" dirty="0">
-                <a:solidFill>
-                  <a:srgbClr val="000000"/>
-                </a:solidFill>
-                <a:latin typeface="Segoe UI" panose="020B0502040204020203" pitchFamily="34" charset="0"/>
-              </a:rPr>
-              <a:t>@</a:t>
-            </a:r>
-            <a:r>
-              <a:rPr lang="en-US" kern="1400" dirty="0" err="1">
-                <a:solidFill>
-                  <a:srgbClr val="000000"/>
-                </a:solidFill>
-                <a:latin typeface="Segoe UI" panose="020B0502040204020203" pitchFamily="34" charset="0"/>
-              </a:rPr>
-              <a:t>SQLPowerShell</a:t>
-            </a:r>
-            <a:endParaRPr lang="en-US" sz="1600" kern="1400" dirty="0">
-              <a:solidFill>
-                <a:srgbClr val="000000"/>
-              </a:solidFill>
-              <a:latin typeface="Agency FB" panose="020B0503020202020204" pitchFamily="34" charset="0"/>
-            </a:endParaRPr>
-          </a:p>
-          <a:p>
-            <a:pPr>
-              <a:lnSpc>
-                <a:spcPct val="119000"/>
-              </a:lnSpc>
-              <a:spcAft>
-                <a:spcPts val="600"/>
-              </a:spcAft>
-            </a:pPr>
-            <a:r>
-              <a:rPr lang="en-US" kern="1400" dirty="0">
-                <a:solidFill>
-                  <a:srgbClr val="000000"/>
-                </a:solidFill>
-                <a:latin typeface="Segoe UI" panose="020B0502040204020203" pitchFamily="34" charset="0"/>
-              </a:rPr>
-              <a:t> Trello: sqlps.io/</a:t>
-            </a:r>
-            <a:r>
-              <a:rPr lang="en-US" b="1" kern="1400" dirty="0">
-                <a:solidFill>
-                  <a:srgbClr val="000000"/>
-                </a:solidFill>
-                <a:latin typeface="Segoe UI" panose="020B0502040204020203" pitchFamily="34" charset="0"/>
-              </a:rPr>
-              <a:t>vote</a:t>
-            </a:r>
-            <a:br>
-              <a:rPr lang="en-US" kern="1400" dirty="0">
-                <a:solidFill>
-                  <a:srgbClr val="000000"/>
-                </a:solidFill>
-                <a:latin typeface="Segoe UI" panose="020B0502040204020203" pitchFamily="34" charset="0"/>
-              </a:rPr>
-            </a:br>
-            <a:r>
-              <a:rPr lang="en-US" kern="1400" dirty="0">
-                <a:solidFill>
-                  <a:srgbClr val="000000"/>
-                </a:solidFill>
-                <a:latin typeface="Segoe UI" panose="020B0502040204020203" pitchFamily="34" charset="0"/>
-              </a:rPr>
-              <a:t> Slack: sqlps.io/</a:t>
-            </a:r>
-            <a:r>
-              <a:rPr lang="en-US" b="1" kern="1400" dirty="0">
-                <a:solidFill>
-                  <a:srgbClr val="000000"/>
-                </a:solidFill>
-                <a:latin typeface="Segoe UI" panose="020B0502040204020203" pitchFamily="34" charset="0"/>
-              </a:rPr>
-              <a:t>slack</a:t>
-            </a:r>
-            <a:br>
-              <a:rPr lang="en-US" kern="1400" dirty="0">
-                <a:solidFill>
-                  <a:srgbClr val="000000"/>
-                </a:solidFill>
-                <a:latin typeface="Segoe UI" panose="020B0502040204020203" pitchFamily="34" charset="0"/>
-              </a:rPr>
-            </a:br>
-            <a:endParaRPr lang="en-US" kern="1400" dirty="0">
-              <a:solidFill>
-                <a:srgbClr val="000000"/>
-              </a:solidFill>
-              <a:latin typeface="Calibri" panose="020F0502020204030204" pitchFamily="34" charset="0"/>
-            </a:endParaRPr>
-          </a:p>
-        </p:txBody>
-      </p:sp>
-      <p:sp>
-        <p:nvSpPr>
-          <p:cNvPr id="53" name="Rectangle 52"/>
-          <p:cNvSpPr/>
+            <a:pPr algn="ctr"/>
+            <a:r>
+              <a:rPr lang="en-GB" sz="8000" dirty="0"/>
+              <a:t>You Want to Learn More?</a:t>
+            </a:r>
+          </a:p>
+          <a:p>
+            <a:endParaRPr lang="en-GB" dirty="0"/>
+          </a:p>
+        </p:txBody>
+      </p:sp>
+      <p:sp>
+        <p:nvSpPr>
+          <p:cNvPr id="3" name="TextBox 2"/>
+          <p:cNvSpPr txBox="1"/>
           <p:nvPr/>
         </p:nvSpPr>
         <p:spPr>
           <a:xfrm>
-            <a:off x="212306" y="4249139"/>
-            <a:ext cx="3290018" cy="2528384"/>
-          </a:xfrm>
-          <a:prstGeom prst="rect">
-            <a:avLst/>
-          </a:prstGeom>
-        </p:spPr>
-        <p:txBody>
-          <a:bodyPr wrap="square">
-            <a:spAutoFit/>
-          </a:bodyPr>
-          <a:lstStyle/>
-          <a:p>
-            <a:pPr>
-              <a:lnSpc>
-                <a:spcPct val="113000"/>
-              </a:lnSpc>
-            </a:pPr>
-            <a:r>
-              <a:rPr lang="en-GB" sz="2400" b="1" kern="1400" dirty="0">
-                <a:solidFill>
-                  <a:srgbClr val="000000"/>
-                </a:solidFill>
-                <a:latin typeface="Segoe UI" panose="020B0502040204020203" pitchFamily="34" charset="0"/>
-              </a:rPr>
-              <a:t>On YouTube  </a:t>
-            </a:r>
-          </a:p>
-          <a:p>
-            <a:pPr>
-              <a:lnSpc>
-                <a:spcPct val="113000"/>
-              </a:lnSpc>
-            </a:pPr>
-            <a:r>
-              <a:rPr lang="en-GB" sz="1600" kern="1400" dirty="0">
-                <a:solidFill>
-                  <a:srgbClr val="000000"/>
-                </a:solidFill>
-                <a:latin typeface="Segoe UI" panose="020B0502040204020203" pitchFamily="34" charset="0"/>
-              </a:rPr>
-              <a:t>sqlps.io/video</a:t>
-            </a:r>
-            <a:br>
-              <a:rPr lang="en-GB" sz="1600" kern="1400" dirty="0">
-                <a:solidFill>
-                  <a:srgbClr val="000000"/>
-                </a:solidFill>
-                <a:latin typeface="Segoe UI" panose="020B0502040204020203" pitchFamily="34" charset="0"/>
-              </a:rPr>
-            </a:br>
-            <a:endParaRPr lang="en-GB" sz="1600" kern="1400" dirty="0">
-              <a:solidFill>
-                <a:srgbClr val="000000"/>
-              </a:solidFill>
-              <a:latin typeface="Agency FB" panose="020B0503020202020204" pitchFamily="34" charset="0"/>
-            </a:endParaRPr>
-          </a:p>
-          <a:p>
-            <a:pPr marL="228600" indent="-228600">
-              <a:lnSpc>
-                <a:spcPct val="115000"/>
-              </a:lnSpc>
-            </a:pPr>
-            <a:r>
-              <a:rPr lang="en-GB" sz="1600" kern="1400" dirty="0">
-                <a:solidFill>
-                  <a:srgbClr val="000000"/>
-                </a:solidFill>
-                <a:latin typeface="Symbol" panose="05050102010706020507" pitchFamily="18" charset="2"/>
-              </a:rPr>
-              <a:t>·</a:t>
-            </a:r>
-            <a:r>
-              <a:rPr lang="en-GB" sz="1600" kern="1400" dirty="0">
-                <a:solidFill>
-                  <a:srgbClr val="000000"/>
-                </a:solidFill>
-                <a:latin typeface="Agency FB" panose="020B0503020202020204" pitchFamily="34" charset="0"/>
-              </a:rPr>
-              <a:t> </a:t>
-            </a:r>
-            <a:r>
-              <a:rPr lang="en-GB" sz="1600" kern="1400" dirty="0">
-                <a:solidFill>
-                  <a:srgbClr val="000000"/>
-                </a:solidFill>
-                <a:latin typeface="Segoe UI" panose="020B0502040204020203" pitchFamily="34" charset="0"/>
-              </a:rPr>
-              <a:t>21 Videos already posted</a:t>
-            </a:r>
-            <a:endParaRPr lang="en-GB" sz="1600" kern="1400" dirty="0">
-              <a:solidFill>
-                <a:srgbClr val="000000"/>
-              </a:solidFill>
-              <a:latin typeface="Agency FB" panose="020B0503020202020204" pitchFamily="34" charset="0"/>
-            </a:endParaRPr>
-          </a:p>
-          <a:p>
-            <a:pPr marL="228600" indent="-228600">
-              <a:lnSpc>
-                <a:spcPct val="115000"/>
-              </a:lnSpc>
-            </a:pPr>
-            <a:r>
-              <a:rPr lang="en-GB" sz="1600" kern="1400" dirty="0">
-                <a:solidFill>
-                  <a:srgbClr val="000000"/>
-                </a:solidFill>
-                <a:latin typeface="Symbol" panose="05050102010706020507" pitchFamily="18" charset="2"/>
-              </a:rPr>
-              <a:t>·</a:t>
-            </a:r>
-            <a:r>
-              <a:rPr lang="en-GB" sz="1600" kern="1400" dirty="0">
-                <a:solidFill>
-                  <a:srgbClr val="000000"/>
-                </a:solidFill>
-                <a:latin typeface="Agency FB" panose="020B0503020202020204" pitchFamily="34" charset="0"/>
-              </a:rPr>
-              <a:t> </a:t>
-            </a:r>
-            <a:r>
-              <a:rPr lang="en-GB" sz="1600" kern="1400" dirty="0">
-                <a:solidFill>
-                  <a:srgbClr val="000000"/>
-                </a:solidFill>
-                <a:latin typeface="Segoe UI" panose="020B0502040204020203" pitchFamily="34" charset="0"/>
-              </a:rPr>
-              <a:t>New Videos posted every month</a:t>
-            </a:r>
-            <a:endParaRPr lang="en-GB" sz="1600" kern="1400" dirty="0">
-              <a:solidFill>
-                <a:srgbClr val="000000"/>
-              </a:solidFill>
-              <a:latin typeface="Agency FB" panose="020B0503020202020204" pitchFamily="34" charset="0"/>
-            </a:endParaRPr>
-          </a:p>
-          <a:p>
-            <a:pPr marL="228600" indent="-228600">
-              <a:lnSpc>
-                <a:spcPct val="115000"/>
-              </a:lnSpc>
-            </a:pPr>
-            <a:r>
-              <a:rPr lang="en-GB" sz="1600" kern="1400" dirty="0">
-                <a:solidFill>
-                  <a:srgbClr val="000000"/>
-                </a:solidFill>
-                <a:latin typeface="Symbol" panose="05050102010706020507" pitchFamily="18" charset="2"/>
-              </a:rPr>
-              <a:t>·</a:t>
-            </a:r>
-            <a:r>
-              <a:rPr lang="en-GB" sz="1600" kern="1400" dirty="0">
-                <a:solidFill>
-                  <a:srgbClr val="000000"/>
-                </a:solidFill>
-                <a:latin typeface="Agency FB" panose="020B0503020202020204" pitchFamily="34" charset="0"/>
-              </a:rPr>
-              <a:t> </a:t>
-            </a:r>
-            <a:r>
-              <a:rPr lang="en-GB" sz="1600" kern="1400" dirty="0">
-                <a:solidFill>
-                  <a:srgbClr val="000000"/>
-                </a:solidFill>
-                <a:latin typeface="Segoe UI" panose="020B0502040204020203" pitchFamily="34" charset="0"/>
-              </a:rPr>
-              <a:t>Subscribe to be notified when we post new videos</a:t>
-            </a:r>
-            <a:endParaRPr lang="en-GB" sz="1600" kern="1400" dirty="0">
-              <a:solidFill>
-                <a:srgbClr val="000000"/>
-              </a:solidFill>
-              <a:latin typeface="Agency FB" panose="020B0503020202020204" pitchFamily="34" charset="0"/>
-            </a:endParaRPr>
-          </a:p>
-          <a:p>
-            <a:pPr>
-              <a:lnSpc>
-                <a:spcPct val="119000"/>
-              </a:lnSpc>
-              <a:spcAft>
-                <a:spcPts val="600"/>
-              </a:spcAft>
-            </a:pPr>
-            <a:r>
-              <a:rPr lang="en-GB" kern="1400" dirty="0">
-                <a:solidFill>
-                  <a:srgbClr val="000000"/>
-                </a:solidFill>
-                <a:latin typeface="Calibri" panose="020F0502020204030204" pitchFamily="34" charset="0"/>
-              </a:rPr>
-              <a:t> </a:t>
-            </a:r>
-          </a:p>
-        </p:txBody>
-      </p:sp>
-      <p:sp>
-        <p:nvSpPr>
-          <p:cNvPr id="54" name="Rectangle 53"/>
-          <p:cNvSpPr/>
-          <p:nvPr/>
-        </p:nvSpPr>
-        <p:spPr>
-          <a:xfrm>
-            <a:off x="2898475" y="2020244"/>
-            <a:ext cx="6096000" cy="2139881"/>
-          </a:xfrm>
-          <a:prstGeom prst="rect">
-            <a:avLst/>
-          </a:prstGeom>
-        </p:spPr>
-        <p:txBody>
-          <a:bodyPr>
-            <a:spAutoFit/>
-          </a:bodyPr>
-          <a:lstStyle/>
-          <a:p>
-            <a:pPr>
-              <a:lnSpc>
-                <a:spcPct val="119000"/>
-              </a:lnSpc>
-              <a:spcAft>
-                <a:spcPts val="600"/>
-              </a:spcAft>
-            </a:pPr>
-            <a:r>
-              <a:rPr lang="en-GB" b="1" kern="1400" dirty="0">
-                <a:solidFill>
-                  <a:srgbClr val="000000"/>
-                </a:solidFill>
-                <a:latin typeface="Segoe UI" panose="020B0502040204020203" pitchFamily="34" charset="0"/>
-              </a:rPr>
-              <a:t>Need to catch up on the changes to </a:t>
-            </a:r>
-            <a:br>
-              <a:rPr lang="en-GB" b="1" kern="1400" dirty="0">
-                <a:solidFill>
-                  <a:srgbClr val="000000"/>
-                </a:solidFill>
-                <a:latin typeface="Segoe UI" panose="020B0502040204020203" pitchFamily="34" charset="0"/>
-              </a:rPr>
-            </a:br>
-            <a:r>
-              <a:rPr lang="en-GB" b="1" kern="1400" dirty="0">
-                <a:solidFill>
-                  <a:srgbClr val="000000"/>
-                </a:solidFill>
-                <a:latin typeface="Segoe UI" panose="020B0502040204020203" pitchFamily="34" charset="0"/>
-              </a:rPr>
-              <a:t>SQL PowerShell in 2016?</a:t>
-            </a:r>
-            <a:endParaRPr lang="en-GB" sz="1100" kern="1400" dirty="0">
-              <a:solidFill>
-                <a:srgbClr val="000000"/>
-              </a:solidFill>
-              <a:latin typeface="Calibri" panose="020F0502020204030204" pitchFamily="34" charset="0"/>
-            </a:endParaRPr>
-          </a:p>
-          <a:p>
-            <a:pPr>
-              <a:lnSpc>
-                <a:spcPct val="119000"/>
-              </a:lnSpc>
-              <a:spcAft>
-                <a:spcPts val="600"/>
-              </a:spcAft>
-            </a:pPr>
-            <a:r>
-              <a:rPr lang="en-GB" b="1" kern="1400" dirty="0">
-                <a:solidFill>
-                  <a:srgbClr val="3399FF"/>
-                </a:solidFill>
-                <a:latin typeface="Segoe UI" panose="020B0502040204020203" pitchFamily="34" charset="0"/>
-              </a:rPr>
-              <a:t>Recording of July 2016 VC Meeting</a:t>
-            </a:r>
-            <a:endParaRPr lang="en-GB" sz="1100" kern="1400" dirty="0">
-              <a:solidFill>
-                <a:srgbClr val="000000"/>
-              </a:solidFill>
-              <a:latin typeface="Calibri" panose="020F0502020204030204" pitchFamily="34" charset="0"/>
-            </a:endParaRPr>
-          </a:p>
-          <a:p>
-            <a:pPr>
-              <a:lnSpc>
-                <a:spcPct val="119000"/>
-              </a:lnSpc>
-              <a:spcAft>
-                <a:spcPts val="600"/>
-              </a:spcAft>
-            </a:pPr>
-            <a:r>
-              <a:rPr lang="en-GB" sz="1600" i="1" kern="1400" dirty="0">
-                <a:solidFill>
-                  <a:srgbClr val="000000"/>
-                </a:solidFill>
-                <a:latin typeface="Segoe UI" panose="020B0502040204020203" pitchFamily="34" charset="0"/>
-              </a:rPr>
-              <a:t>Presented by: The PowerShell VC Team</a:t>
-            </a:r>
-            <a:endParaRPr lang="en-GB" sz="1100" kern="1400" dirty="0">
-              <a:solidFill>
-                <a:srgbClr val="000000"/>
-              </a:solidFill>
-              <a:latin typeface="Calibri" panose="020F0502020204030204" pitchFamily="34" charset="0"/>
-            </a:endParaRPr>
-          </a:p>
-          <a:p>
-            <a:pPr>
-              <a:lnSpc>
-                <a:spcPct val="119000"/>
-              </a:lnSpc>
-              <a:spcAft>
-                <a:spcPts val="600"/>
-              </a:spcAft>
-            </a:pPr>
-            <a:r>
-              <a:rPr lang="en-GB" sz="1400" b="1" kern="1400" dirty="0">
-                <a:solidFill>
-                  <a:srgbClr val="000000"/>
-                </a:solidFill>
-                <a:latin typeface="Segoe UI" panose="020B0502040204020203" pitchFamily="34" charset="0"/>
-              </a:rPr>
-              <a:t>http://sqlps.io/july2016video</a:t>
-            </a:r>
-            <a:endParaRPr lang="en-GB" sz="1100" kern="1400" dirty="0">
-              <a:solidFill>
-                <a:srgbClr val="000000"/>
-              </a:solidFill>
-              <a:latin typeface="Calibri" panose="020F0502020204030204" pitchFamily="34" charset="0"/>
-            </a:endParaRPr>
-          </a:p>
-          <a:p>
-            <a:pPr>
-              <a:lnSpc>
-                <a:spcPct val="119000"/>
-              </a:lnSpc>
-              <a:spcAft>
-                <a:spcPts val="600"/>
-              </a:spcAft>
-            </a:pPr>
-            <a:r>
-              <a:rPr lang="en-GB" sz="1100" kern="1400" dirty="0">
-                <a:solidFill>
-                  <a:srgbClr val="000000"/>
-                </a:solidFill>
-                <a:latin typeface="Calibri" panose="020F0502020204030204" pitchFamily="34" charset="0"/>
-              </a:rPr>
-              <a:t> </a:t>
-            </a:r>
-            <a:endParaRPr lang="en-GB" sz="1100" kern="1400" dirty="0">
-              <a:ln>
-                <a:noFill/>
-              </a:ln>
-              <a:solidFill>
-                <a:srgbClr val="000000"/>
-              </a:solidFill>
-              <a:effectLst/>
-              <a:latin typeface="Calibri" panose="020F0502020204030204" pitchFamily="34" charset="0"/>
-            </a:endParaRPr>
-          </a:p>
-        </p:txBody>
-      </p:sp>
-      <p:pic>
-        <p:nvPicPr>
-          <p:cNvPr id="1079" name="Picture 55" descr="PoShVC_JulyMeeting"/>
-          <p:cNvPicPr>
-            <a:picLocks noChangeAspect="1" noChangeArrowheads="1"/>
-          </p:cNvPicPr>
-          <p:nvPr/>
-        </p:nvPicPr>
-        <p:blipFill>
-          <a:blip r:embed="rId4">
-            <a:extLst>
-              <a:ext uri="{28A0092B-C50C-407E-A947-70E740481C1C}">
-                <a14:useLocalDpi xmlns:a14="http://schemas.microsoft.com/office/drawing/2010/main" val="0"/>
-              </a:ext>
-            </a:extLst>
-          </a:blip>
-          <a:srcRect/>
-          <a:stretch>
-            <a:fillRect/>
-          </a:stretch>
-        </p:blipFill>
-        <p:spPr bwMode="auto">
-          <a:xfrm>
-            <a:off x="7236063" y="2227495"/>
-            <a:ext cx="1361598" cy="1361598"/>
+            <a:off x="4939990" y="5865541"/>
+            <a:ext cx="3200400" cy="369332"/>
           </a:xfrm>
           <a:prstGeom prst="rect">
             <a:avLst/>
           </a:prstGeom>
           <a:noFill/>
-          <a:ln>
-            <a:noFill/>
-          </a:ln>
-          <a:effectLst/>
-          <a:extLst>
-            <a:ext uri="{909E8E84-426E-40DD-AFC4-6F175D3DCCD1}">
-              <a14:hiddenFill xmlns:a14="http://schemas.microsoft.com/office/drawing/2010/main">
-                <a:solidFill>
-                  <a:srgbClr val="3399FF"/>
-                </a:solidFill>
-              </a14:hiddenFill>
-            </a:ext>
-            <a:ext uri="{91240B29-F687-4F45-9708-019B960494DF}">
-              <a14:hiddenLine xmlns:a14="http://schemas.microsoft.com/office/drawing/2010/main" w="25400" algn="ctr">
-                <a:solidFill>
-                  <a:srgbClr val="000000"/>
-                </a:solidFill>
-                <a:miter lim="800000"/>
-                <a:headEnd/>
-                <a:tailEnd/>
-              </a14:hiddenLine>
-            </a:ext>
-            <a:ext uri="{AF507438-7753-43E0-B8FC-AC1667EBCBE1}">
-              <a14:hiddenEffects xmlns:a14="http://schemas.microsoft.com/office/drawing/2010/main">
-                <a:effectLst>
-                  <a:outerShdw dist="35921" dir="2700000" algn="ctr" rotWithShape="0">
-                    <a:srgbClr val="000000"/>
-                  </a:outerShdw>
-                </a:effectLst>
-              </a14:hiddenEffects>
-            </a:ext>
-          </a:extLst>
         </p:spPr>
-      </p:pic>
-      <p:sp>
-        <p:nvSpPr>
-          <p:cNvPr id="55" name="Rectangle 54"/>
-          <p:cNvSpPr/>
+        <p:txBody>
+          <a:bodyPr wrap="square" rtlCol="0">
+            <a:spAutoFit/>
+          </a:bodyPr>
+          <a:lstStyle/>
+          <a:p>
+            <a:r>
+              <a:rPr lang="en-GB" dirty="0"/>
+              <a:t>@</a:t>
+            </a:r>
+            <a:r>
+              <a:rPr lang="en-GB" dirty="0" err="1"/>
+              <a:t>sqldbawithbeard</a:t>
+            </a:r>
+            <a:endParaRPr lang="en-GB" dirty="0"/>
+          </a:p>
+        </p:txBody>
+      </p:sp>
+      <p:sp>
+        <p:nvSpPr>
+          <p:cNvPr id="4" name="TextBox 3"/>
+          <p:cNvSpPr txBox="1"/>
           <p:nvPr/>
         </p:nvSpPr>
         <p:spPr>
           <a:xfrm>
-            <a:off x="3502324" y="6216553"/>
-            <a:ext cx="2455672" cy="421975"/>
+            <a:off x="709447" y="2690648"/>
+            <a:ext cx="10838446" cy="1477328"/>
           </a:xfrm>
           <a:prstGeom prst="rect">
             <a:avLst/>
           </a:prstGeom>
+          <a:noFill/>
         </p:spPr>
         <p:txBody>
-          <a:bodyPr wrap="none">
+          <a:bodyPr wrap="square" rtlCol="0">
             <a:spAutoFit/>
           </a:bodyPr>
           <a:lstStyle/>
           <a:p>
-            <a:pPr>
-              <a:lnSpc>
-                <a:spcPct val="119000"/>
-              </a:lnSpc>
-              <a:spcAft>
-                <a:spcPts val="600"/>
-              </a:spcAft>
-            </a:pPr>
-            <a:r>
-              <a:rPr lang="en-US" kern="1400" dirty="0">
-                <a:solidFill>
-                  <a:srgbClr val="595959"/>
-                </a:solidFill>
-                <a:latin typeface="Calibri" panose="020F0502020204030204" pitchFamily="34" charset="0"/>
+            <a:pPr algn="ctr"/>
+            <a:r>
+              <a:rPr lang="en-GB" dirty="0"/>
+              <a:t>It’s PowerShell 10</a:t>
+            </a:r>
+            <a:r>
+              <a:rPr lang="en-GB" baseline="30000" dirty="0"/>
+              <a:t>th</a:t>
+            </a:r>
+            <a:r>
+              <a:rPr lang="en-GB" dirty="0"/>
+              <a:t> Anniversary November 14</a:t>
+            </a:r>
+            <a:r>
+              <a:rPr lang="en-GB" baseline="30000" dirty="0"/>
+              <a:t>th</a:t>
+            </a:r>
+            <a:endParaRPr lang="en-GB" dirty="0"/>
+          </a:p>
+          <a:p>
+            <a:endParaRPr lang="en-GB" dirty="0"/>
+          </a:p>
+          <a:p>
+            <a:pPr algn="ctr"/>
+            <a:r>
+              <a:rPr lang="en-GB" dirty="0"/>
+              <a:t>Whole (American) day of live (</a:t>
+            </a:r>
+            <a:r>
+              <a:rPr lang="en-GB" dirty="0" err="1"/>
+              <a:t>ish</a:t>
+            </a:r>
+            <a:r>
+              <a:rPr lang="en-GB" dirty="0"/>
+              <a:t>) Channel 9 sessions</a:t>
+            </a:r>
+          </a:p>
+          <a:p>
+            <a:endParaRPr lang="en-GB" dirty="0"/>
+          </a:p>
+          <a:p>
+            <a:r>
+              <a:rPr lang="en-GB" dirty="0">
+                <a:hlinkClick r:id="rId3"/>
               </a:rPr>
-              <a:t>PowerShell.SQLPASS.org</a:t>
-            </a:r>
-            <a:endParaRPr lang="en-US" kern="1400" dirty="0">
-              <a:solidFill>
-                <a:srgbClr val="000000"/>
-              </a:solidFill>
-              <a:latin typeface="Calibri" panose="020F0502020204030204" pitchFamily="34" charset="0"/>
-            </a:endParaRPr>
-          </a:p>
-        </p:txBody>
-      </p:sp>
-      <p:sp>
-        <p:nvSpPr>
-          <p:cNvPr id="56" name="Rectangle 55"/>
-          <p:cNvSpPr/>
-          <p:nvPr/>
-        </p:nvSpPr>
-        <p:spPr>
-          <a:xfrm>
-            <a:off x="6170779" y="6216553"/>
-            <a:ext cx="2647135" cy="421975"/>
-          </a:xfrm>
-          <a:prstGeom prst="rect">
-            <a:avLst/>
-          </a:prstGeom>
-        </p:spPr>
-        <p:txBody>
-          <a:bodyPr wrap="none">
-            <a:spAutoFit/>
-          </a:bodyPr>
-          <a:lstStyle/>
-          <a:p>
-            <a:pPr>
-              <a:lnSpc>
-                <a:spcPct val="119000"/>
-              </a:lnSpc>
-              <a:spcAft>
-                <a:spcPts val="600"/>
-              </a:spcAft>
-            </a:pPr>
-            <a:r>
-              <a:rPr lang="en-US" kern="1400" dirty="0">
-                <a:solidFill>
-                  <a:srgbClr val="595959"/>
-                </a:solidFill>
-                <a:latin typeface="Segoe UI" panose="020B0502040204020203" pitchFamily="34" charset="0"/>
-              </a:rPr>
-              <a:t>PowerShell@sqlpass.org</a:t>
-            </a:r>
-            <a:endParaRPr lang="en-US" kern="1400" dirty="0">
-              <a:solidFill>
-                <a:srgbClr val="000000"/>
-              </a:solidFill>
-              <a:latin typeface="Calibri" panose="020F0502020204030204" pitchFamily="34" charset="0"/>
-            </a:endParaRPr>
-          </a:p>
-        </p:txBody>
-      </p:sp>
-      <p:sp>
-        <p:nvSpPr>
-          <p:cNvPr id="57" name="Rectangle 56"/>
-          <p:cNvSpPr/>
-          <p:nvPr/>
-        </p:nvSpPr>
-        <p:spPr>
-          <a:xfrm>
-            <a:off x="9207258" y="3589093"/>
-            <a:ext cx="2697192" cy="3170355"/>
-          </a:xfrm>
-          <a:prstGeom prst="rect">
-            <a:avLst/>
-          </a:prstGeom>
-        </p:spPr>
-        <p:txBody>
-          <a:bodyPr wrap="square">
-            <a:spAutoFit/>
-          </a:bodyPr>
-          <a:lstStyle/>
-          <a:p>
-            <a:pPr>
-              <a:lnSpc>
-                <a:spcPct val="119000"/>
-              </a:lnSpc>
-              <a:spcAft>
-                <a:spcPts val="600"/>
-              </a:spcAft>
-            </a:pPr>
-            <a:r>
-              <a:rPr lang="en-GB" sz="2400" b="1" kern="1400" dirty="0">
-                <a:solidFill>
-                  <a:srgbClr val="3399FF"/>
-                </a:solidFill>
-                <a:latin typeface="Segoe UI" panose="020B0502040204020203" pitchFamily="34" charset="0"/>
-              </a:rPr>
-              <a:t>Thurs, Aug 18</a:t>
-            </a:r>
-            <a:endParaRPr lang="en-GB" sz="1400" kern="1400" dirty="0">
-              <a:solidFill>
-                <a:srgbClr val="000000"/>
-              </a:solidFill>
-              <a:latin typeface="Calibri" panose="020F0502020204030204" pitchFamily="34" charset="0"/>
-            </a:endParaRPr>
-          </a:p>
-          <a:p>
-            <a:pPr>
-              <a:lnSpc>
-                <a:spcPct val="150000"/>
-              </a:lnSpc>
-              <a:spcAft>
-                <a:spcPts val="600"/>
-              </a:spcAft>
-            </a:pPr>
-            <a:r>
-              <a:rPr lang="en-GB" kern="1400" dirty="0">
-                <a:solidFill>
-                  <a:srgbClr val="000000"/>
-                </a:solidFill>
-                <a:latin typeface="Segoe UI" panose="020B0502040204020203" pitchFamily="34" charset="0"/>
-              </a:rPr>
-              <a:t>PowerShell, SQL and Power BI - Reducing your Context Switching</a:t>
-            </a:r>
-          </a:p>
-          <a:p>
-            <a:pPr>
-              <a:lnSpc>
-                <a:spcPct val="150000"/>
-              </a:lnSpc>
-              <a:spcAft>
-                <a:spcPts val="600"/>
-              </a:spcAft>
-            </a:pPr>
-            <a:r>
-              <a:rPr lang="en-GB" sz="2000" i="1" kern="1400" dirty="0">
-                <a:solidFill>
-                  <a:srgbClr val="000000"/>
-                </a:solidFill>
-                <a:latin typeface="Segoe UI" panose="020B0502040204020203" pitchFamily="34" charset="0"/>
-              </a:rPr>
-              <a:t>Rob Sewell</a:t>
-            </a:r>
-            <a:endParaRPr lang="en-GB" sz="1400" kern="1400" dirty="0">
-              <a:solidFill>
-                <a:srgbClr val="000000"/>
-              </a:solidFill>
-              <a:latin typeface="Calibri" panose="020F0502020204030204" pitchFamily="34" charset="0"/>
-            </a:endParaRPr>
-          </a:p>
-          <a:p>
-            <a:pPr>
-              <a:lnSpc>
-                <a:spcPct val="119000"/>
-              </a:lnSpc>
-              <a:spcAft>
-                <a:spcPts val="600"/>
-              </a:spcAft>
-            </a:pPr>
-            <a:r>
-              <a:rPr lang="en-GB" sz="2000" b="1" kern="1400" dirty="0">
-                <a:solidFill>
-                  <a:srgbClr val="000000"/>
-                </a:solidFill>
-                <a:latin typeface="Segoe UI" panose="020B0502040204020203" pitchFamily="34" charset="0"/>
-              </a:rPr>
-              <a:t>http://sqlps.io/m2</a:t>
-            </a:r>
-            <a:endParaRPr lang="en-GB" sz="1400" kern="1400" dirty="0">
-              <a:solidFill>
-                <a:srgbClr val="000000"/>
-              </a:solidFill>
-              <a:latin typeface="Calibri" panose="020F0502020204030204" pitchFamily="34" charset="0"/>
-            </a:endParaRPr>
-          </a:p>
-          <a:p>
-            <a:pPr>
-              <a:lnSpc>
-                <a:spcPct val="119000"/>
-              </a:lnSpc>
-              <a:spcAft>
-                <a:spcPts val="600"/>
-              </a:spcAft>
-            </a:pPr>
-            <a:r>
-              <a:rPr lang="en-GB" sz="1400" kern="1400" dirty="0">
-                <a:solidFill>
-                  <a:srgbClr val="000000"/>
-                </a:solidFill>
-                <a:latin typeface="Calibri" panose="020F0502020204030204" pitchFamily="34" charset="0"/>
-              </a:rPr>
-              <a:t> </a:t>
-            </a:r>
-            <a:endParaRPr lang="en-GB" sz="1400" kern="1400" dirty="0">
-              <a:ln>
-                <a:noFill/>
-              </a:ln>
-              <a:solidFill>
-                <a:srgbClr val="000000"/>
-              </a:solidFill>
-              <a:effectLst/>
-              <a:latin typeface="Calibri" panose="020F0502020204030204" pitchFamily="34" charset="0"/>
-            </a:endParaRPr>
-          </a:p>
-        </p:txBody>
-      </p:sp>
-      <p:sp>
-        <p:nvSpPr>
-          <p:cNvPr id="58" name="Rectangle 57"/>
-          <p:cNvSpPr/>
-          <p:nvPr/>
-        </p:nvSpPr>
-        <p:spPr>
-          <a:xfrm>
-            <a:off x="9207258" y="966101"/>
-            <a:ext cx="3134263" cy="2516971"/>
-          </a:xfrm>
-          <a:prstGeom prst="rect">
-            <a:avLst/>
-          </a:prstGeom>
-        </p:spPr>
-        <p:txBody>
-          <a:bodyPr wrap="square">
-            <a:spAutoFit/>
-          </a:bodyPr>
-          <a:lstStyle/>
-          <a:p>
-            <a:pPr>
-              <a:lnSpc>
-                <a:spcPct val="119000"/>
-              </a:lnSpc>
-              <a:spcAft>
-                <a:spcPts val="600"/>
-              </a:spcAft>
-            </a:pPr>
-            <a:r>
-              <a:rPr lang="en-GB" sz="2400" b="1" kern="1400" dirty="0">
-                <a:solidFill>
-                  <a:srgbClr val="3399FF"/>
-                </a:solidFill>
-                <a:latin typeface="Segoe UI" panose="020B0502040204020203" pitchFamily="34" charset="0"/>
-              </a:rPr>
-              <a:t>Wed, Sep 13 </a:t>
-            </a:r>
-          </a:p>
-          <a:p>
-            <a:pPr>
-              <a:lnSpc>
-                <a:spcPct val="119000"/>
-              </a:lnSpc>
-              <a:spcAft>
-                <a:spcPts val="600"/>
-              </a:spcAft>
-            </a:pPr>
-            <a:r>
-              <a:rPr lang="en-GB" sz="2000" kern="1400" dirty="0">
-                <a:solidFill>
-                  <a:srgbClr val="000000"/>
-                </a:solidFill>
-                <a:latin typeface="Segoe UI" panose="020B0502040204020203" pitchFamily="34" charset="0"/>
-              </a:rPr>
-              <a:t>Need to Speed: </a:t>
-            </a:r>
-            <a:br>
-              <a:rPr lang="en-GB" sz="2000" kern="1400" dirty="0">
-                <a:solidFill>
-                  <a:srgbClr val="000000"/>
-                </a:solidFill>
-                <a:latin typeface="Segoe UI" panose="020B0502040204020203" pitchFamily="34" charset="0"/>
-              </a:rPr>
-            </a:br>
-            <a:r>
-              <a:rPr lang="en-GB" sz="2000" kern="1400" dirty="0">
-                <a:solidFill>
-                  <a:srgbClr val="000000"/>
-                </a:solidFill>
-                <a:latin typeface="Segoe UI" panose="020B0502040204020203" pitchFamily="34" charset="0"/>
-              </a:rPr>
-              <a:t>Pragmatic Problem Solving with PowerShell</a:t>
-            </a:r>
-            <a:br>
-              <a:rPr lang="en-GB" kern="1400" dirty="0">
-                <a:solidFill>
-                  <a:srgbClr val="000000"/>
-                </a:solidFill>
-                <a:latin typeface="Segoe UI" panose="020B0502040204020203" pitchFamily="34" charset="0"/>
-              </a:rPr>
-            </a:br>
-            <a:r>
-              <a:rPr lang="en-GB" sz="2000" i="1" kern="1400" dirty="0">
-                <a:solidFill>
-                  <a:srgbClr val="000000"/>
-                </a:solidFill>
-                <a:latin typeface="Segoe UI" panose="020B0502040204020203" pitchFamily="34" charset="0"/>
-              </a:rPr>
-              <a:t>Claudio Silva</a:t>
-            </a:r>
-            <a:endParaRPr lang="en-GB" sz="1400" kern="1400" dirty="0">
-              <a:solidFill>
-                <a:srgbClr val="000000"/>
-              </a:solidFill>
-              <a:latin typeface="Calibri" panose="020F0502020204030204" pitchFamily="34" charset="0"/>
-            </a:endParaRPr>
-          </a:p>
-          <a:p>
-            <a:pPr>
-              <a:lnSpc>
-                <a:spcPct val="119000"/>
-              </a:lnSpc>
-              <a:spcAft>
-                <a:spcPts val="600"/>
-              </a:spcAft>
-            </a:pPr>
-            <a:r>
-              <a:rPr lang="en-GB" sz="2000" b="1" kern="1400" dirty="0">
-                <a:solidFill>
-                  <a:srgbClr val="000000"/>
-                </a:solidFill>
-                <a:latin typeface="Segoe UI" panose="020B0502040204020203" pitchFamily="34" charset="0"/>
-              </a:rPr>
-              <a:t>http://sqlps.io/m3</a:t>
-            </a:r>
-            <a:endParaRPr lang="en-GB" sz="1400" kern="1400" dirty="0">
-              <a:solidFill>
-                <a:srgbClr val="000000"/>
-              </a:solidFill>
-              <a:latin typeface="Calibri" panose="020F0502020204030204" pitchFamily="34" charset="0"/>
-            </a:endParaRPr>
+              <a:t>https://blogs.msdn.microsoft.com/powershell/2016/11/08/join-the-powershell-10th-anniversary-celebration/</a:t>
+            </a:r>
+            <a:r>
+              <a:rPr lang="en-GB" dirty="0"/>
+              <a:t> </a:t>
+            </a:r>
+            <a:endParaRPr lang="en-GB" dirty="0"/>
           </a:p>
         </p:txBody>
       </p:sp>
     </p:spTree>
     <p:extLst>
       <p:ext uri="{BB962C8B-B14F-4D97-AF65-F5344CB8AC3E}">
-        <p14:creationId xmlns:p14="http://schemas.microsoft.com/office/powerpoint/2010/main" val="1585452018"/>
+        <p14:creationId xmlns:p14="http://schemas.microsoft.com/office/powerpoint/2010/main" val="2623941909"/>
       </p:ext>
     </p:extLst>
   </p:cSld>
@@ -9308,40 +8816,123 @@
       </p:grpSpPr>
       <p:sp>
         <p:nvSpPr>
-          <p:cNvPr id="5" name="Rectangle 4"/>
-          <p:cNvSpPr>
-            <a:spLocks noGrp="1" noRot="1" noChangeAspect="1" noMove="1" noResize="1" noEditPoints="1" noAdjustHandles="1" noChangeArrowheads="1" noChangeShapeType="1" noTextEdit="1"/>
-          </p:cNvSpPr>
-          <p:nvPr>
-            <p:extLst>
-              <p:ext uri="{386F3935-93C4-4BCD-93E2-E3B085C9AB24}">
-                <p16:designElem xmlns:p16="http://schemas.microsoft.com/office/powerpoint/2015/main" val="1"/>
-              </p:ext>
-            </p:extLst>
-          </p:nvPr>
-        </p:nvSpPr>
-        <p:spPr bwMode="white">
+          <p:cNvPr id="34" name="Rectangle 33"/>
+          <p:cNvSpPr/>
+          <p:nvPr/>
+        </p:nvSpPr>
+        <p:spPr>
           <a:xfrm>
-            <a:off x="0" y="0"/>
-            <a:ext cx="12192000" cy="6858000"/>
+            <a:off x="2800710" y="347878"/>
+            <a:ext cx="6291531" cy="1633845"/>
           </a:xfrm>
           <a:prstGeom prst="rect">
             <a:avLst/>
           </a:prstGeom>
-          <a:solidFill>
-            <a:schemeClr val="bg1"/>
-          </a:solidFill>
-          <a:ln>
-            <a:noFill/>
-          </a:ln>
-          <a:effectLst/>
         </p:spPr>
+        <p:txBody>
+          <a:bodyPr wrap="square">
+            <a:spAutoFit/>
+          </a:bodyPr>
+          <a:lstStyle/>
+          <a:p>
+            <a:pPr>
+              <a:lnSpc>
+                <a:spcPct val="113000"/>
+              </a:lnSpc>
+            </a:pPr>
+            <a:r>
+              <a:rPr lang="en-US" sz="4400" b="1" kern="1400" dirty="0">
+                <a:solidFill>
+                  <a:srgbClr val="000000"/>
+                </a:solidFill>
+                <a:latin typeface="Segoe UI" panose="020B0502040204020203" pitchFamily="34" charset="0"/>
+              </a:rPr>
+              <a:t>PowerShell VC of PASS</a:t>
+            </a:r>
+            <a:endParaRPr lang="en-US" sz="4400" kern="1400" dirty="0">
+              <a:solidFill>
+                <a:srgbClr val="000000"/>
+              </a:solidFill>
+              <a:latin typeface="Agency FB" panose="020B0503020202020204" pitchFamily="34" charset="0"/>
+            </a:endParaRPr>
+          </a:p>
+          <a:p>
+            <a:pPr>
+              <a:lnSpc>
+                <a:spcPct val="115000"/>
+              </a:lnSpc>
+            </a:pPr>
+            <a:r>
+              <a:rPr lang="en-US" sz="2400" kern="1400" dirty="0">
+                <a:solidFill>
+                  <a:srgbClr val="000000"/>
+                </a:solidFill>
+                <a:latin typeface="Calibri" panose="020F0502020204030204" pitchFamily="34" charset="0"/>
+              </a:rPr>
+              <a:t> </a:t>
+            </a:r>
+            <a:r>
+              <a:rPr lang="en-US" sz="2400" b="1" kern="1400" dirty="0">
+                <a:solidFill>
+                  <a:srgbClr val="3399FF"/>
+                </a:solidFill>
+                <a:latin typeface="Segoe UI" panose="020B0502040204020203" pitchFamily="34" charset="0"/>
+              </a:rPr>
+              <a:t>PowerShell for SQL Server</a:t>
+            </a:r>
+            <a:endParaRPr lang="en-US" sz="2400" b="1" kern="1400" dirty="0">
+              <a:solidFill>
+                <a:srgbClr val="3399FF"/>
+              </a:solidFill>
+              <a:latin typeface="Palatino Linotype" panose="02040502050505030304" pitchFamily="18" charset="0"/>
+            </a:endParaRPr>
+          </a:p>
+          <a:p>
+            <a:pPr>
+              <a:lnSpc>
+                <a:spcPct val="119000"/>
+              </a:lnSpc>
+              <a:spcAft>
+                <a:spcPts val="600"/>
+              </a:spcAft>
+            </a:pPr>
+            <a:r>
+              <a:rPr lang="en-US" sz="400" kern="1400" dirty="0">
+                <a:solidFill>
+                  <a:srgbClr val="000000"/>
+                </a:solidFill>
+                <a:latin typeface="Calibri" panose="020F0502020204030204" pitchFamily="34" charset="0"/>
+              </a:rPr>
+              <a:t> </a:t>
+            </a:r>
+          </a:p>
+          <a:p>
+            <a:pPr>
+              <a:lnSpc>
+                <a:spcPct val="119000"/>
+              </a:lnSpc>
+              <a:spcAft>
+                <a:spcPts val="600"/>
+              </a:spcAft>
+            </a:pPr>
+            <a:endParaRPr lang="en-US" sz="1100" kern="1400" dirty="0">
+              <a:ln>
+                <a:noFill/>
+              </a:ln>
+              <a:solidFill>
+                <a:srgbClr val="000000"/>
+              </a:solidFill>
+              <a:effectLst/>
+              <a:latin typeface="Calibri" panose="020F0502020204030204" pitchFamily="34" charset="0"/>
+            </a:endParaRPr>
+          </a:p>
+        </p:txBody>
       </p:sp>
       <p:pic>
         <p:nvPicPr>
-          <p:cNvPr id="3" name="Picture 2"/>
+          <p:cNvPr id="1062" name="Picture 38" descr="sqlps-icon-new-small"/>
           <p:cNvPicPr>
-            <a:picLocks noChangeAspect="1"/>
+            <a:picLocks noChangeAspect="1" noChangeArrowheads="1"/>
           </p:cNvPicPr>
           <p:nvPr/>
         </p:nvPicPr>
@@ -9353,158 +8944,832 @@
               </a:ext>
             </a:extLst>
           </a:blip>
+          <a:srcRect/>
           <a:stretch>
             <a:fillRect/>
           </a:stretch>
         </p:blipFill>
+        <p:spPr bwMode="auto">
+          <a:xfrm>
+            <a:off x="417581" y="347878"/>
+            <a:ext cx="2058838" cy="1952712"/>
+          </a:xfrm>
+          <a:prstGeom prst="rect">
+            <a:avLst/>
+          </a:prstGeom>
+          <a:noFill/>
+          <a:ln>
+            <a:noFill/>
+          </a:ln>
+          <a:effectLst/>
+          <a:extLst>
+            <a:ext uri="{909E8E84-426E-40DD-AFC4-6F175D3DCCD1}">
+              <a14:hiddenFill xmlns:a14="http://schemas.microsoft.com/office/drawing/2010/main">
+                <a:solidFill>
+                  <a:srgbClr val="3399FF"/>
+                </a:solidFill>
+              </a14:hiddenFill>
+            </a:ext>
+            <a:ext uri="{91240B29-F687-4F45-9708-019B960494DF}">
+              <a14:hiddenLine xmlns:a14="http://schemas.microsoft.com/office/drawing/2010/main" w="25400" algn="ctr">
+                <a:solidFill>
+                  <a:srgbClr val="000000"/>
+                </a:solidFill>
+                <a:miter lim="800000"/>
+                <a:headEnd/>
+                <a:tailEnd/>
+              </a14:hiddenLine>
+            </a:ext>
+            <a:ext uri="{AF507438-7753-43E0-B8FC-AC1667EBCBE1}">
+              <a14:hiddenEffects xmlns:a14="http://schemas.microsoft.com/office/drawing/2010/main">
+                <a:effectLst>
+                  <a:outerShdw dist="35921" dir="2700000" algn="ctr" rotWithShape="0">
+                    <a:srgbClr val="000000"/>
+                  </a:outerShdw>
+                </a:effectLst>
+              </a14:hiddenEffects>
+            </a:ext>
+          </a:extLst>
+        </p:spPr>
+      </p:pic>
+      <p:sp>
+        <p:nvSpPr>
+          <p:cNvPr id="52" name="Rectangle 51"/>
+          <p:cNvSpPr/>
+          <p:nvPr/>
+        </p:nvSpPr>
         <p:spPr>
           <a:xfrm>
-            <a:off x="5153822" y="582179"/>
-            <a:ext cx="6553545" cy="5701583"/>
+            <a:off x="210307" y="3750300"/>
+            <a:ext cx="2473386" cy="2466253"/>
           </a:xfrm>
           <a:prstGeom prst="rect">
             <a:avLst/>
           </a:prstGeom>
         </p:spPr>
-      </p:pic>
-      <p:sp>
-        <p:nvSpPr>
-          <p:cNvPr id="6" name="Rectangle 5"/>
-          <p:cNvSpPr>
-            <a:spLocks noGrp="1" noRot="1" noChangeAspect="1" noMove="1" noResize="1" noEditPoints="1" noAdjustHandles="1" noChangeArrowheads="1" noChangeShapeType="1" noTextEdit="1"/>
-          </p:cNvSpPr>
-          <p:nvPr>
-            <p:extLst>
-              <p:ext uri="{386F3935-93C4-4BCD-93E2-E3B085C9AB24}">
-                <p16:designElem xmlns:p16="http://schemas.microsoft.com/office/powerpoint/2015/main" val="1"/>
-              </p:ext>
-            </p:extLst>
-          </p:nvPr>
-        </p:nvSpPr>
-        <p:spPr bwMode="ltGray">
-          <a:xfrm>
-            <a:off x="336884" y="311449"/>
-            <a:ext cx="4332307" cy="6179552"/>
-          </a:xfrm>
-          <a:prstGeom prst="rect">
-            <a:avLst/>
-          </a:prstGeom>
-          <a:solidFill>
-            <a:schemeClr val="tx1">
-              <a:lumMod val="75000"/>
-              <a:lumOff val="25000"/>
-            </a:schemeClr>
-          </a:solidFill>
-          <a:ln w="127000" cap="sq" cmpd="thinThick">
-            <a:solidFill>
-              <a:schemeClr val="tx1">
-                <a:lumMod val="75000"/>
-                <a:lumOff val="25000"/>
-              </a:schemeClr>
-            </a:solidFill>
-          </a:ln>
-        </p:spPr>
-        <p:style>
-          <a:lnRef idx="2">
-            <a:schemeClr val="accent1">
-              <a:shade val="50000"/>
-            </a:schemeClr>
-          </a:lnRef>
-          <a:fillRef idx="1">
-            <a:schemeClr val="accent1"/>
-          </a:fillRef>
-          <a:effectRef idx="0">
-            <a:schemeClr val="accent1"/>
-          </a:effectRef>
-          <a:fontRef idx="minor">
-            <a:schemeClr val="lt1"/>
-          </a:fontRef>
-        </p:style>
-        <p:txBody>
-          <a:bodyPr rtlCol="0" anchor="ctr"/>
+        <p:txBody>
+          <a:bodyPr wrap="square">
+            <a:spAutoFit/>
+          </a:bodyPr>
           <a:lstStyle/>
           <a:p>
-            <a:pPr algn="ctr"/>
-            <a:endParaRPr lang="en-US"/>
-          </a:p>
-        </p:txBody>
-      </p:sp>
-      <p:sp>
-        <p:nvSpPr>
-          <p:cNvPr id="2" name="TextBox 1"/>
-          <p:cNvSpPr txBox="1"/>
+            <a:r>
+              <a:rPr lang="en-US" sz="2400" kern="1400" dirty="0">
+                <a:solidFill>
+                  <a:srgbClr val="000000"/>
+                </a:solidFill>
+                <a:latin typeface="Segoe UI" panose="020B0502040204020203" pitchFamily="34" charset="0"/>
+              </a:rPr>
+              <a:t> </a:t>
+            </a:r>
+            <a:r>
+              <a:rPr lang="en-US" sz="2400" b="1" dirty="0"/>
+              <a:t>Join the Conversation</a:t>
+            </a:r>
+          </a:p>
+          <a:p>
+            <a:endParaRPr lang="en-US" sz="2400" dirty="0"/>
+          </a:p>
+          <a:p>
+            <a:r>
+              <a:rPr lang="en-US" dirty="0"/>
+              <a:t> </a:t>
+            </a:r>
+            <a:r>
+              <a:rPr lang="en-US" kern="1400" dirty="0">
+                <a:solidFill>
+                  <a:srgbClr val="000000"/>
+                </a:solidFill>
+                <a:latin typeface="Segoe UI" panose="020B0502040204020203" pitchFamily="34" charset="0"/>
+              </a:rPr>
+              <a:t>@</a:t>
+            </a:r>
+            <a:r>
+              <a:rPr lang="en-US" kern="1400" dirty="0" err="1">
+                <a:solidFill>
+                  <a:srgbClr val="000000"/>
+                </a:solidFill>
+                <a:latin typeface="Segoe UI" panose="020B0502040204020203" pitchFamily="34" charset="0"/>
+              </a:rPr>
+              <a:t>SQLPowerShell</a:t>
+            </a:r>
+            <a:endParaRPr lang="en-US" sz="1600" kern="1400" dirty="0">
+              <a:solidFill>
+                <a:srgbClr val="000000"/>
+              </a:solidFill>
+              <a:latin typeface="Agency FB" panose="020B0503020202020204" pitchFamily="34" charset="0"/>
+            </a:endParaRPr>
+          </a:p>
+          <a:p>
+            <a:pPr>
+              <a:lnSpc>
+                <a:spcPct val="119000"/>
+              </a:lnSpc>
+              <a:spcAft>
+                <a:spcPts val="600"/>
+              </a:spcAft>
+            </a:pPr>
+            <a:r>
+              <a:rPr lang="en-US" kern="1400" dirty="0">
+                <a:solidFill>
+                  <a:srgbClr val="000000"/>
+                </a:solidFill>
+                <a:latin typeface="Segoe UI" panose="020B0502040204020203" pitchFamily="34" charset="0"/>
+              </a:rPr>
+              <a:t> Trello: sqlps.io/</a:t>
+            </a:r>
+            <a:r>
+              <a:rPr lang="en-US" b="1" kern="1400" dirty="0">
+                <a:solidFill>
+                  <a:srgbClr val="000000"/>
+                </a:solidFill>
+                <a:latin typeface="Segoe UI" panose="020B0502040204020203" pitchFamily="34" charset="0"/>
+              </a:rPr>
+              <a:t>vote</a:t>
+            </a:r>
+            <a:br>
+              <a:rPr lang="en-US" kern="1400" dirty="0">
+                <a:solidFill>
+                  <a:srgbClr val="000000"/>
+                </a:solidFill>
+                <a:latin typeface="Segoe UI" panose="020B0502040204020203" pitchFamily="34" charset="0"/>
+              </a:rPr>
+            </a:br>
+            <a:r>
+              <a:rPr lang="en-US" kern="1400" dirty="0">
+                <a:solidFill>
+                  <a:srgbClr val="000000"/>
+                </a:solidFill>
+                <a:latin typeface="Segoe UI" panose="020B0502040204020203" pitchFamily="34" charset="0"/>
+              </a:rPr>
+              <a:t> Slack: sqlps.io/</a:t>
+            </a:r>
+            <a:r>
+              <a:rPr lang="en-US" b="1" kern="1400" dirty="0">
+                <a:solidFill>
+                  <a:srgbClr val="000000"/>
+                </a:solidFill>
+                <a:latin typeface="Segoe UI" panose="020B0502040204020203" pitchFamily="34" charset="0"/>
+              </a:rPr>
+              <a:t>slack</a:t>
+            </a:r>
+            <a:br>
+              <a:rPr lang="en-US" kern="1400" dirty="0">
+                <a:solidFill>
+                  <a:srgbClr val="000000"/>
+                </a:solidFill>
+                <a:latin typeface="Segoe UI" panose="020B0502040204020203" pitchFamily="34" charset="0"/>
+              </a:rPr>
+            </a:br>
+            <a:endParaRPr lang="en-US" kern="1400" dirty="0">
+              <a:solidFill>
+                <a:srgbClr val="000000"/>
+              </a:solidFill>
+              <a:latin typeface="Calibri" panose="020F0502020204030204" pitchFamily="34" charset="0"/>
+            </a:endParaRPr>
+          </a:p>
+        </p:txBody>
+      </p:sp>
+      <p:sp>
+        <p:nvSpPr>
+          <p:cNvPr id="53" name="Rectangle 52"/>
+          <p:cNvSpPr/>
           <p:nvPr/>
         </p:nvSpPr>
         <p:spPr>
           <a:xfrm>
-            <a:off x="742950" y="742951"/>
-            <a:ext cx="3476625" cy="4962524"/>
+            <a:off x="8817914" y="3818653"/>
+            <a:ext cx="3290018" cy="2528384"/>
           </a:xfrm>
           <a:prstGeom prst="rect">
             <a:avLst/>
           </a:prstGeom>
         </p:spPr>
         <p:txBody>
-          <a:bodyPr vert="horz" lIns="91440" tIns="45720" rIns="91440" bIns="45720" rtlCol="0" anchor="ctr">
-            <a:normAutofit/>
+          <a:bodyPr wrap="square">
+            <a:spAutoFit/>
           </a:bodyPr>
           <a:lstStyle/>
           <a:p>
-            <a:pPr algn="ctr">
+            <a:pPr>
               <a:lnSpc>
-                <a:spcPct val="90000"/>
+                <a:spcPct val="113000"/>
               </a:lnSpc>
-              <a:spcBef>
-                <a:spcPct val="0"/>
-              </a:spcBef>
             </a:pPr>
             <a:r>
-              <a:rPr lang="en-US" sz="4800">
-                <a:solidFill>
-                  <a:schemeClr val="bg1"/>
-                </a:solidFill>
-                <a:latin typeface="+mj-lt"/>
-                <a:ea typeface="+mj-ea"/>
-                <a:cs typeface="+mj-cs"/>
+              <a:rPr lang="en-GB" sz="2400" b="1" kern="1400" dirty="0">
+                <a:solidFill>
+                  <a:srgbClr val="000000"/>
+                </a:solidFill>
+                <a:latin typeface="Segoe UI" panose="020B0502040204020203" pitchFamily="34" charset="0"/>
               </a:rPr>
-              <a:t>Questions?</a:t>
-            </a:r>
-          </a:p>
-        </p:txBody>
-      </p:sp>
-      <p:sp>
-        <p:nvSpPr>
-          <p:cNvPr id="4" name="TextBox 3"/>
-          <p:cNvSpPr txBox="1"/>
+              <a:t>On YouTube  </a:t>
+            </a:r>
+          </a:p>
+          <a:p>
+            <a:pPr>
+              <a:lnSpc>
+                <a:spcPct val="113000"/>
+              </a:lnSpc>
+            </a:pPr>
+            <a:r>
+              <a:rPr lang="en-GB" sz="1600" kern="1400" dirty="0">
+                <a:solidFill>
+                  <a:srgbClr val="000000"/>
+                </a:solidFill>
+                <a:latin typeface="Segoe UI" panose="020B0502040204020203" pitchFamily="34" charset="0"/>
+              </a:rPr>
+              <a:t>sqlps.io/video</a:t>
+            </a:r>
+            <a:br>
+              <a:rPr lang="en-GB" sz="1600" kern="1400" dirty="0">
+                <a:solidFill>
+                  <a:srgbClr val="000000"/>
+                </a:solidFill>
+                <a:latin typeface="Segoe UI" panose="020B0502040204020203" pitchFamily="34" charset="0"/>
+              </a:rPr>
+            </a:br>
+            <a:endParaRPr lang="en-GB" sz="1600" kern="1400" dirty="0">
+              <a:solidFill>
+                <a:srgbClr val="000000"/>
+              </a:solidFill>
+              <a:latin typeface="Agency FB" panose="020B0503020202020204" pitchFamily="34" charset="0"/>
+            </a:endParaRPr>
+          </a:p>
+          <a:p>
+            <a:pPr marL="228600" indent="-228600">
+              <a:lnSpc>
+                <a:spcPct val="115000"/>
+              </a:lnSpc>
+            </a:pPr>
+            <a:r>
+              <a:rPr lang="en-GB" sz="1600" kern="1400" dirty="0">
+                <a:solidFill>
+                  <a:srgbClr val="000000"/>
+                </a:solidFill>
+                <a:latin typeface="Symbol" panose="05050102010706020507" pitchFamily="18" charset="2"/>
+              </a:rPr>
+              <a:t>·</a:t>
+            </a:r>
+            <a:r>
+              <a:rPr lang="en-GB" sz="1600" kern="1400" dirty="0">
+                <a:solidFill>
+                  <a:srgbClr val="000000"/>
+                </a:solidFill>
+                <a:latin typeface="Agency FB" panose="020B0503020202020204" pitchFamily="34" charset="0"/>
+              </a:rPr>
+              <a:t> </a:t>
+            </a:r>
+            <a:r>
+              <a:rPr lang="en-GB" sz="1600" kern="1400" dirty="0">
+                <a:solidFill>
+                  <a:srgbClr val="000000"/>
+                </a:solidFill>
+                <a:latin typeface="Segoe UI" panose="020B0502040204020203" pitchFamily="34" charset="0"/>
+              </a:rPr>
+              <a:t>21 Videos already posted</a:t>
+            </a:r>
+            <a:endParaRPr lang="en-GB" sz="1600" kern="1400" dirty="0">
+              <a:solidFill>
+                <a:srgbClr val="000000"/>
+              </a:solidFill>
+              <a:latin typeface="Agency FB" panose="020B0503020202020204" pitchFamily="34" charset="0"/>
+            </a:endParaRPr>
+          </a:p>
+          <a:p>
+            <a:pPr marL="228600" indent="-228600">
+              <a:lnSpc>
+                <a:spcPct val="115000"/>
+              </a:lnSpc>
+            </a:pPr>
+            <a:r>
+              <a:rPr lang="en-GB" sz="1600" kern="1400" dirty="0">
+                <a:solidFill>
+                  <a:srgbClr val="000000"/>
+                </a:solidFill>
+                <a:latin typeface="Symbol" panose="05050102010706020507" pitchFamily="18" charset="2"/>
+              </a:rPr>
+              <a:t>·</a:t>
+            </a:r>
+            <a:r>
+              <a:rPr lang="en-GB" sz="1600" kern="1400" dirty="0">
+                <a:solidFill>
+                  <a:srgbClr val="000000"/>
+                </a:solidFill>
+                <a:latin typeface="Agency FB" panose="020B0503020202020204" pitchFamily="34" charset="0"/>
+              </a:rPr>
+              <a:t> </a:t>
+            </a:r>
+            <a:r>
+              <a:rPr lang="en-GB" sz="1600" kern="1400" dirty="0">
+                <a:solidFill>
+                  <a:srgbClr val="000000"/>
+                </a:solidFill>
+                <a:latin typeface="Segoe UI" panose="020B0502040204020203" pitchFamily="34" charset="0"/>
+              </a:rPr>
+              <a:t>New Videos posted every month</a:t>
+            </a:r>
+            <a:endParaRPr lang="en-GB" sz="1600" kern="1400" dirty="0">
+              <a:solidFill>
+                <a:srgbClr val="000000"/>
+              </a:solidFill>
+              <a:latin typeface="Agency FB" panose="020B0503020202020204" pitchFamily="34" charset="0"/>
+            </a:endParaRPr>
+          </a:p>
+          <a:p>
+            <a:pPr marL="228600" indent="-228600">
+              <a:lnSpc>
+                <a:spcPct val="115000"/>
+              </a:lnSpc>
+            </a:pPr>
+            <a:r>
+              <a:rPr lang="en-GB" sz="1600" kern="1400" dirty="0">
+                <a:solidFill>
+                  <a:srgbClr val="000000"/>
+                </a:solidFill>
+                <a:latin typeface="Symbol" panose="05050102010706020507" pitchFamily="18" charset="2"/>
+              </a:rPr>
+              <a:t>·</a:t>
+            </a:r>
+            <a:r>
+              <a:rPr lang="en-GB" sz="1600" kern="1400" dirty="0">
+                <a:solidFill>
+                  <a:srgbClr val="000000"/>
+                </a:solidFill>
+                <a:latin typeface="Agency FB" panose="020B0503020202020204" pitchFamily="34" charset="0"/>
+              </a:rPr>
+              <a:t> </a:t>
+            </a:r>
+            <a:r>
+              <a:rPr lang="en-GB" sz="1600" kern="1400" dirty="0">
+                <a:solidFill>
+                  <a:srgbClr val="000000"/>
+                </a:solidFill>
+                <a:latin typeface="Segoe UI" panose="020B0502040204020203" pitchFamily="34" charset="0"/>
+              </a:rPr>
+              <a:t>Subscribe to be notified when we post new videos</a:t>
+            </a:r>
+            <a:endParaRPr lang="en-GB" sz="1600" kern="1400" dirty="0">
+              <a:solidFill>
+                <a:srgbClr val="000000"/>
+              </a:solidFill>
+              <a:latin typeface="Agency FB" panose="020B0503020202020204" pitchFamily="34" charset="0"/>
+            </a:endParaRPr>
+          </a:p>
+          <a:p>
+            <a:pPr>
+              <a:lnSpc>
+                <a:spcPct val="119000"/>
+              </a:lnSpc>
+              <a:spcAft>
+                <a:spcPts val="600"/>
+              </a:spcAft>
+            </a:pPr>
+            <a:r>
+              <a:rPr lang="en-GB" kern="1400" dirty="0">
+                <a:solidFill>
+                  <a:srgbClr val="000000"/>
+                </a:solidFill>
+                <a:latin typeface="Calibri" panose="020F0502020204030204" pitchFamily="34" charset="0"/>
+              </a:rPr>
+              <a:t> </a:t>
+            </a:r>
+          </a:p>
+        </p:txBody>
+      </p:sp>
+      <p:sp>
+        <p:nvSpPr>
+          <p:cNvPr id="54" name="Rectangle 53"/>
+          <p:cNvSpPr/>
           <p:nvPr/>
         </p:nvSpPr>
         <p:spPr>
           <a:xfrm>
-            <a:off x="5887890" y="6306671"/>
-            <a:ext cx="3573075" cy="184666"/>
+            <a:off x="2800710" y="1741834"/>
+            <a:ext cx="6096000" cy="2139881"/>
+          </a:xfrm>
+          <a:prstGeom prst="rect">
+            <a:avLst/>
+          </a:prstGeom>
+        </p:spPr>
+        <p:txBody>
+          <a:bodyPr>
+            <a:spAutoFit/>
+          </a:bodyPr>
+          <a:lstStyle/>
+          <a:p>
+            <a:pPr>
+              <a:lnSpc>
+                <a:spcPct val="119000"/>
+              </a:lnSpc>
+              <a:spcAft>
+                <a:spcPts val="600"/>
+              </a:spcAft>
+            </a:pPr>
+            <a:r>
+              <a:rPr lang="en-GB" b="1" kern="1400" dirty="0">
+                <a:solidFill>
+                  <a:srgbClr val="000000"/>
+                </a:solidFill>
+                <a:latin typeface="Segoe UI" panose="020B0502040204020203" pitchFamily="34" charset="0"/>
+              </a:rPr>
+              <a:t>Need to catch up on the changes to </a:t>
+            </a:r>
+            <a:br>
+              <a:rPr lang="en-GB" b="1" kern="1400" dirty="0">
+                <a:solidFill>
+                  <a:srgbClr val="000000"/>
+                </a:solidFill>
+                <a:latin typeface="Segoe UI" panose="020B0502040204020203" pitchFamily="34" charset="0"/>
+              </a:rPr>
+            </a:br>
+            <a:r>
+              <a:rPr lang="en-GB" b="1" kern="1400" dirty="0">
+                <a:solidFill>
+                  <a:srgbClr val="000000"/>
+                </a:solidFill>
+                <a:latin typeface="Segoe UI" panose="020B0502040204020203" pitchFamily="34" charset="0"/>
+              </a:rPr>
+              <a:t>SQL PowerShell in 2016?</a:t>
+            </a:r>
+            <a:endParaRPr lang="en-GB" sz="1100" kern="1400" dirty="0">
+              <a:solidFill>
+                <a:srgbClr val="000000"/>
+              </a:solidFill>
+              <a:latin typeface="Calibri" panose="020F0502020204030204" pitchFamily="34" charset="0"/>
+            </a:endParaRPr>
+          </a:p>
+          <a:p>
+            <a:pPr>
+              <a:lnSpc>
+                <a:spcPct val="119000"/>
+              </a:lnSpc>
+              <a:spcAft>
+                <a:spcPts val="600"/>
+              </a:spcAft>
+            </a:pPr>
+            <a:r>
+              <a:rPr lang="en-GB" b="1" kern="1400" dirty="0">
+                <a:solidFill>
+                  <a:srgbClr val="3399FF"/>
+                </a:solidFill>
+                <a:latin typeface="Segoe UI" panose="020B0502040204020203" pitchFamily="34" charset="0"/>
+              </a:rPr>
+              <a:t>Recording of July 2016 VC Meeting</a:t>
+            </a:r>
+            <a:endParaRPr lang="en-GB" sz="1100" kern="1400" dirty="0">
+              <a:solidFill>
+                <a:srgbClr val="000000"/>
+              </a:solidFill>
+              <a:latin typeface="Calibri" panose="020F0502020204030204" pitchFamily="34" charset="0"/>
+            </a:endParaRPr>
+          </a:p>
+          <a:p>
+            <a:pPr>
+              <a:lnSpc>
+                <a:spcPct val="119000"/>
+              </a:lnSpc>
+              <a:spcAft>
+                <a:spcPts val="600"/>
+              </a:spcAft>
+            </a:pPr>
+            <a:r>
+              <a:rPr lang="en-GB" sz="1600" i="1" kern="1400" dirty="0">
+                <a:solidFill>
+                  <a:srgbClr val="000000"/>
+                </a:solidFill>
+                <a:latin typeface="Segoe UI" panose="020B0502040204020203" pitchFamily="34" charset="0"/>
+              </a:rPr>
+              <a:t>Presented by: The PowerShell VC Team</a:t>
+            </a:r>
+            <a:endParaRPr lang="en-GB" sz="1100" kern="1400" dirty="0">
+              <a:solidFill>
+                <a:srgbClr val="000000"/>
+              </a:solidFill>
+              <a:latin typeface="Calibri" panose="020F0502020204030204" pitchFamily="34" charset="0"/>
+            </a:endParaRPr>
+          </a:p>
+          <a:p>
+            <a:pPr>
+              <a:lnSpc>
+                <a:spcPct val="119000"/>
+              </a:lnSpc>
+              <a:spcAft>
+                <a:spcPts val="600"/>
+              </a:spcAft>
+            </a:pPr>
+            <a:r>
+              <a:rPr lang="en-GB" sz="1400" b="1" kern="1400" dirty="0">
+                <a:solidFill>
+                  <a:srgbClr val="000000"/>
+                </a:solidFill>
+                <a:latin typeface="Segoe UI" panose="020B0502040204020203" pitchFamily="34" charset="0"/>
+              </a:rPr>
+              <a:t>http://sqlps.io/july2016video</a:t>
+            </a:r>
+            <a:endParaRPr lang="en-GB" sz="1100" kern="1400" dirty="0">
+              <a:solidFill>
+                <a:srgbClr val="000000"/>
+              </a:solidFill>
+              <a:latin typeface="Calibri" panose="020F0502020204030204" pitchFamily="34" charset="0"/>
+            </a:endParaRPr>
+          </a:p>
+          <a:p>
+            <a:pPr>
+              <a:lnSpc>
+                <a:spcPct val="119000"/>
+              </a:lnSpc>
+              <a:spcAft>
+                <a:spcPts val="600"/>
+              </a:spcAft>
+            </a:pPr>
+            <a:r>
+              <a:rPr lang="en-GB" sz="1100" kern="1400" dirty="0">
+                <a:solidFill>
+                  <a:srgbClr val="000000"/>
+                </a:solidFill>
+                <a:latin typeface="Calibri" panose="020F0502020204030204" pitchFamily="34" charset="0"/>
+              </a:rPr>
+              <a:t> </a:t>
+            </a:r>
+            <a:endParaRPr lang="en-GB" sz="1100" kern="1400" dirty="0">
+              <a:ln>
+                <a:noFill/>
+              </a:ln>
+              <a:solidFill>
+                <a:srgbClr val="000000"/>
+              </a:solidFill>
+              <a:effectLst/>
+              <a:latin typeface="Calibri" panose="020F0502020204030204" pitchFamily="34" charset="0"/>
+            </a:endParaRPr>
+          </a:p>
+        </p:txBody>
+      </p:sp>
+      <p:pic>
+        <p:nvPicPr>
+          <p:cNvPr id="1079" name="Picture 55" descr="PoShVC_JulyMeeting"/>
+          <p:cNvPicPr>
+            <a:picLocks noChangeAspect="1" noChangeArrowheads="1"/>
+          </p:cNvPicPr>
+          <p:nvPr/>
+        </p:nvPicPr>
+        <p:blipFill>
+          <a:blip r:embed="rId4">
+            <a:extLst>
+              <a:ext uri="{28A0092B-C50C-407E-A947-70E740481C1C}">
+                <a14:useLocalDpi xmlns:a14="http://schemas.microsoft.com/office/drawing/2010/main" val="0"/>
+              </a:ext>
+            </a:extLst>
+          </a:blip>
+          <a:srcRect/>
+          <a:stretch>
+            <a:fillRect/>
+          </a:stretch>
+        </p:blipFill>
+        <p:spPr bwMode="auto">
+          <a:xfrm>
+            <a:off x="7188766" y="1892233"/>
+            <a:ext cx="1361598" cy="1361598"/>
           </a:xfrm>
           <a:prstGeom prst="rect">
             <a:avLst/>
           </a:prstGeom>
           <a:noFill/>
+          <a:ln>
+            <a:noFill/>
+          </a:ln>
+          <a:effectLst/>
+          <a:extLst>
+            <a:ext uri="{909E8E84-426E-40DD-AFC4-6F175D3DCCD1}">
+              <a14:hiddenFill xmlns:a14="http://schemas.microsoft.com/office/drawing/2010/main">
+                <a:solidFill>
+                  <a:srgbClr val="3399FF"/>
+                </a:solidFill>
+              </a14:hiddenFill>
+            </a:ext>
+            <a:ext uri="{91240B29-F687-4F45-9708-019B960494DF}">
+              <a14:hiddenLine xmlns:a14="http://schemas.microsoft.com/office/drawing/2010/main" w="25400" algn="ctr">
+                <a:solidFill>
+                  <a:srgbClr val="000000"/>
+                </a:solidFill>
+                <a:miter lim="800000"/>
+                <a:headEnd/>
+                <a:tailEnd/>
+              </a14:hiddenLine>
+            </a:ext>
+            <a:ext uri="{AF507438-7753-43E0-B8FC-AC1667EBCBE1}">
+              <a14:hiddenEffects xmlns:a14="http://schemas.microsoft.com/office/drawing/2010/main">
+                <a:effectLst>
+                  <a:outerShdw dist="35921" dir="2700000" algn="ctr" rotWithShape="0">
+                    <a:srgbClr val="000000"/>
+                  </a:outerShdw>
+                </a:effectLst>
+              </a14:hiddenEffects>
+            </a:ext>
+          </a:extLst>
         </p:spPr>
-        <p:txBody>
-          <a:bodyPr wrap="square" rtlCol="0">
+      </p:pic>
+      <p:sp>
+        <p:nvSpPr>
+          <p:cNvPr id="55" name="Rectangle 54"/>
+          <p:cNvSpPr/>
+          <p:nvPr/>
+        </p:nvSpPr>
+        <p:spPr>
+          <a:xfrm>
+            <a:off x="3502324" y="6216553"/>
+            <a:ext cx="2455672" cy="421975"/>
+          </a:xfrm>
+          <a:prstGeom prst="rect">
+            <a:avLst/>
+          </a:prstGeom>
+        </p:spPr>
+        <p:txBody>
+          <a:bodyPr wrap="none">
             <a:spAutoFit/>
           </a:bodyPr>
           <a:lstStyle/>
           <a:p>
-            <a:r>
-              <a:rPr lang="en-GB" sz="600" dirty="0"/>
-              <a:t>http://www.menshairforum.com/talk/Thread-Beard-Facts-and-Beards-Meme-Facial-Hair-Manly-Knowledge</a:t>
-            </a:r>
+            <a:pPr>
+              <a:lnSpc>
+                <a:spcPct val="119000"/>
+              </a:lnSpc>
+              <a:spcAft>
+                <a:spcPts val="600"/>
+              </a:spcAft>
+            </a:pPr>
+            <a:r>
+              <a:rPr lang="en-US" kern="1400" dirty="0">
+                <a:solidFill>
+                  <a:srgbClr val="595959"/>
+                </a:solidFill>
+                <a:latin typeface="Calibri" panose="020F0502020204030204" pitchFamily="34" charset="0"/>
+              </a:rPr>
+              <a:t>PowerShell.SQLPASS.org</a:t>
+            </a:r>
+            <a:endParaRPr lang="en-US" kern="1400" dirty="0">
+              <a:solidFill>
+                <a:srgbClr val="000000"/>
+              </a:solidFill>
+              <a:latin typeface="Calibri" panose="020F0502020204030204" pitchFamily="34" charset="0"/>
+            </a:endParaRPr>
+          </a:p>
+        </p:txBody>
+      </p:sp>
+      <p:sp>
+        <p:nvSpPr>
+          <p:cNvPr id="56" name="Rectangle 55"/>
+          <p:cNvSpPr/>
+          <p:nvPr/>
+        </p:nvSpPr>
+        <p:spPr>
+          <a:xfrm>
+            <a:off x="6170779" y="6216553"/>
+            <a:ext cx="2647135" cy="421975"/>
+          </a:xfrm>
+          <a:prstGeom prst="rect">
+            <a:avLst/>
+          </a:prstGeom>
+        </p:spPr>
+        <p:txBody>
+          <a:bodyPr wrap="none">
+            <a:spAutoFit/>
+          </a:bodyPr>
+          <a:lstStyle/>
+          <a:p>
+            <a:pPr>
+              <a:lnSpc>
+                <a:spcPct val="119000"/>
+              </a:lnSpc>
+              <a:spcAft>
+                <a:spcPts val="600"/>
+              </a:spcAft>
+            </a:pPr>
+            <a:r>
+              <a:rPr lang="en-US" kern="1400" dirty="0">
+                <a:solidFill>
+                  <a:srgbClr val="595959"/>
+                </a:solidFill>
+                <a:latin typeface="Segoe UI" panose="020B0502040204020203" pitchFamily="34" charset="0"/>
+              </a:rPr>
+              <a:t>PowerShell@sqlpass.org</a:t>
+            </a:r>
+            <a:endParaRPr lang="en-US" kern="1400" dirty="0">
+              <a:solidFill>
+                <a:srgbClr val="000000"/>
+              </a:solidFill>
+              <a:latin typeface="Calibri" panose="020F0502020204030204" pitchFamily="34" charset="0"/>
+            </a:endParaRPr>
+          </a:p>
+        </p:txBody>
+      </p:sp>
+      <p:sp>
+        <p:nvSpPr>
+          <p:cNvPr id="58" name="Rectangle 57"/>
+          <p:cNvSpPr/>
+          <p:nvPr/>
+        </p:nvSpPr>
+        <p:spPr>
+          <a:xfrm>
+            <a:off x="2963885" y="3796344"/>
+            <a:ext cx="5481144" cy="2150717"/>
+          </a:xfrm>
+          <a:prstGeom prst="rect">
+            <a:avLst/>
+          </a:prstGeom>
+        </p:spPr>
+        <p:txBody>
+          <a:bodyPr wrap="square">
+            <a:spAutoFit/>
+          </a:bodyPr>
+          <a:lstStyle/>
+          <a:p>
+            <a:pPr>
+              <a:lnSpc>
+                <a:spcPct val="119000"/>
+              </a:lnSpc>
+              <a:spcAft>
+                <a:spcPts val="600"/>
+              </a:spcAft>
+            </a:pPr>
+            <a:r>
+              <a:rPr lang="en-GB" sz="2400" b="1" kern="1400" dirty="0">
+                <a:solidFill>
+                  <a:srgbClr val="3399FF"/>
+                </a:solidFill>
+                <a:latin typeface="Segoe UI" panose="020B0502040204020203" pitchFamily="34" charset="0"/>
+              </a:rPr>
+              <a:t>Wednesday, November 16th</a:t>
+            </a:r>
+          </a:p>
+          <a:p>
+            <a:pPr>
+              <a:lnSpc>
+                <a:spcPct val="119000"/>
+              </a:lnSpc>
+              <a:spcAft>
+                <a:spcPts val="600"/>
+              </a:spcAft>
+            </a:pPr>
+            <a:r>
+              <a:rPr lang="en-GB" sz="2000" dirty="0"/>
+              <a:t>Automate Operational Readiness and Validation Testing of SQL Server with PowerShell and Pester</a:t>
+            </a:r>
+            <a:br>
+              <a:rPr lang="en-GB" kern="1400" dirty="0">
+                <a:solidFill>
+                  <a:srgbClr val="000000"/>
+                </a:solidFill>
+                <a:latin typeface="Segoe UI" panose="020B0502040204020203" pitchFamily="34" charset="0"/>
+              </a:rPr>
+            </a:br>
+            <a:r>
+              <a:rPr lang="en-GB" sz="2000" i="1" kern="1400" dirty="0">
+                <a:solidFill>
+                  <a:srgbClr val="000000"/>
+                </a:solidFill>
+                <a:latin typeface="Segoe UI" panose="020B0502040204020203" pitchFamily="34" charset="0"/>
+              </a:rPr>
+              <a:t>Mike F Robbins</a:t>
+            </a:r>
+            <a:endParaRPr lang="en-GB" sz="1400" kern="1400" dirty="0">
+              <a:solidFill>
+                <a:srgbClr val="000000"/>
+              </a:solidFill>
+              <a:latin typeface="Calibri" panose="020F0502020204030204" pitchFamily="34" charset="0"/>
+            </a:endParaRPr>
+          </a:p>
+          <a:p>
+            <a:pPr>
+              <a:lnSpc>
+                <a:spcPct val="119000"/>
+              </a:lnSpc>
+              <a:spcAft>
+                <a:spcPts val="600"/>
+              </a:spcAft>
+            </a:pPr>
+            <a:r>
+              <a:rPr lang="en-GB" sz="2000" b="1" kern="1400" dirty="0">
+                <a:solidFill>
+                  <a:srgbClr val="000000"/>
+                </a:solidFill>
+                <a:latin typeface="Segoe UI" panose="020B0502040204020203" pitchFamily="34" charset="0"/>
+              </a:rPr>
+              <a:t>http://sqlps.io</a:t>
+            </a:r>
+            <a:endParaRPr lang="en-GB" sz="1400" kern="1400" dirty="0">
+              <a:solidFill>
+                <a:srgbClr val="000000"/>
+              </a:solidFill>
+              <a:latin typeface="Calibri" panose="020F0502020204030204" pitchFamily="34" charset="0"/>
+            </a:endParaRPr>
           </a:p>
         </p:txBody>
       </p:sp>
     </p:spTree>
     <p:extLst>
       <p:ext uri="{BB962C8B-B14F-4D97-AF65-F5344CB8AC3E}">
-        <p14:creationId xmlns:p14="http://schemas.microsoft.com/office/powerpoint/2010/main" val="1616556363"/>
+        <p14:creationId xmlns:p14="http://schemas.microsoft.com/office/powerpoint/2010/main" val="1585452018"/>
       </p:ext>
     </p:extLst>
   </p:cSld>

</xml_diff>